<commit_message>
mariadb설치 UTF8 설정 변경
</commit_message>
<xml_diff>
--- a/database/mariadb설치.pptx
+++ b/database/mariadb설치.pptx
@@ -8,17 +8,12 @@
   <p:sldIdLst>
     <p:sldId id="405" r:id="rId3"/>
     <p:sldId id="407" r:id="rId4"/>
-    <p:sldId id="412" r:id="rId5"/>
-    <p:sldId id="413" r:id="rId6"/>
-    <p:sldId id="414" r:id="rId7"/>
-    <p:sldId id="415" r:id="rId8"/>
-    <p:sldId id="416" r:id="rId9"/>
-    <p:sldId id="408" r:id="rId10"/>
-    <p:sldId id="409" r:id="rId11"/>
-    <p:sldId id="410" r:id="rId12"/>
-    <p:sldId id="411" r:id="rId13"/>
-    <p:sldId id="417" r:id="rId14"/>
-    <p:sldId id="418" r:id="rId15"/>
+    <p:sldId id="408" r:id="rId5"/>
+    <p:sldId id="409" r:id="rId6"/>
+    <p:sldId id="410" r:id="rId7"/>
+    <p:sldId id="411" r:id="rId8"/>
+    <p:sldId id="417" r:id="rId9"/>
+    <p:sldId id="418" r:id="rId10"/>
   </p:sldIdLst>
   <p:sldSz cx="12192000" cy="6858000"/>
   <p:notesSz cx="6858000" cy="9144000"/>
@@ -128,11 +123,6 @@
         <p14:section name="모델" id="{596762D4-1208-40BD-9F6F-89907E02A745}">
           <p14:sldIdLst>
             <p14:sldId id="407"/>
-            <p14:sldId id="412"/>
-            <p14:sldId id="413"/>
-            <p14:sldId id="414"/>
-            <p14:sldId id="415"/>
-            <p14:sldId id="416"/>
             <p14:sldId id="408"/>
             <p14:sldId id="409"/>
             <p14:sldId id="410"/>
@@ -315,7 +305,7 @@
                 </a:solidFill>
               </a:rPr>
               <a:pPr/>
-              <a:t>2022-06-16</a:t>
+              <a:t>2022-06-20</a:t>
             </a:fld>
             <a:endParaRPr lang="ko-KR" altLang="en-US">
               <a:solidFill>
@@ -545,7 +535,7 @@
                 </a:solidFill>
               </a:rPr>
               <a:pPr/>
-              <a:t>2022-06-16</a:t>
+              <a:t>2022-06-20</a:t>
             </a:fld>
             <a:endParaRPr lang="ko-KR" altLang="en-US">
               <a:solidFill>
@@ -785,7 +775,7 @@
                 </a:solidFill>
               </a:rPr>
               <a:pPr/>
-              <a:t>2022-06-16</a:t>
+              <a:t>2022-06-20</a:t>
             </a:fld>
             <a:endParaRPr lang="ko-KR" altLang="en-US">
               <a:solidFill>
@@ -1017,7 +1007,7 @@
                 <a:latin typeface="맑은 고딕" charset="0"/>
                 <a:ea typeface="맑은 고딕" charset="0"/>
               </a:rPr>
-              <a:t>2022-06-16</a:t>
+              <a:t>2022-06-20</a:t>
             </a:fld>
             <a:endParaRPr lang="ko-KR" altLang="en-US">
               <a:solidFill>
@@ -1296,7 +1286,7 @@
                 <a:latin typeface="맑은 고딕" charset="0"/>
                 <a:ea typeface="맑은 고딕" charset="0"/>
               </a:rPr>
-              <a:t>2022-06-16</a:t>
+              <a:t>2022-06-20</a:t>
             </a:fld>
             <a:endParaRPr lang="ko-KR" altLang="en-US">
               <a:solidFill>
@@ -1538,7 +1528,7 @@
                 <a:latin typeface="맑은 고딕" charset="0"/>
                 <a:ea typeface="맑은 고딕" charset="0"/>
               </a:rPr>
-              <a:t>2022-06-16</a:t>
+              <a:t>2022-06-20</a:t>
             </a:fld>
             <a:endParaRPr lang="ko-KR" altLang="en-US">
               <a:solidFill>
@@ -1893,7 +1883,7 @@
                 <a:latin typeface="맑은 고딕" charset="0"/>
                 <a:ea typeface="맑은 고딕" charset="0"/>
               </a:rPr>
-              <a:t>2022-06-16</a:t>
+              <a:t>2022-06-20</a:t>
             </a:fld>
             <a:endParaRPr lang="ko-KR" altLang="en-US">
               <a:solidFill>
@@ -2326,7 +2316,7 @@
                 <a:latin typeface="맑은 고딕" charset="0"/>
                 <a:ea typeface="맑은 고딕" charset="0"/>
               </a:rPr>
-              <a:t>2022-06-16</a:t>
+              <a:t>2022-06-20</a:t>
             </a:fld>
             <a:endParaRPr lang="ko-KR" altLang="en-US">
               <a:solidFill>
@@ -2529,7 +2519,7 @@
                 <a:latin typeface="맑은 고딕" charset="0"/>
                 <a:ea typeface="맑은 고딕" charset="0"/>
               </a:rPr>
-              <a:t>2022-06-16</a:t>
+              <a:t>2022-06-20</a:t>
             </a:fld>
             <a:endParaRPr lang="ko-KR" altLang="en-US">
               <a:solidFill>
@@ -2693,7 +2683,7 @@
                 <a:latin typeface="맑은 고딕" charset="0"/>
                 <a:ea typeface="맑은 고딕" charset="0"/>
               </a:rPr>
-              <a:t>2022-06-16</a:t>
+              <a:t>2022-06-20</a:t>
             </a:fld>
             <a:endParaRPr lang="ko-KR" altLang="en-US">
               <a:solidFill>
@@ -3011,7 +3001,7 @@
                 <a:latin typeface="맑은 고딕" charset="0"/>
                 <a:ea typeface="맑은 고딕" charset="0"/>
               </a:rPr>
-              <a:t>2022-06-16</a:t>
+              <a:t>2022-06-20</a:t>
             </a:fld>
             <a:endParaRPr lang="ko-KR" altLang="en-US">
               <a:solidFill>
@@ -3251,7 +3241,7 @@
                 </a:solidFill>
               </a:rPr>
               <a:pPr/>
-              <a:t>2022-06-16</a:t>
+              <a:t>2022-06-20</a:t>
             </a:fld>
             <a:endParaRPr lang="ko-KR" altLang="en-US">
               <a:solidFill>
@@ -3503,7 +3493,7 @@
                 <a:latin typeface="맑은 고딕" charset="0"/>
                 <a:ea typeface="맑은 고딕" charset="0"/>
               </a:rPr>
-              <a:t>2022-06-16</a:t>
+              <a:t>2022-06-20</a:t>
             </a:fld>
             <a:endParaRPr lang="ko-KR" altLang="en-US">
               <a:solidFill>
@@ -3782,7 +3772,7 @@
                 <a:latin typeface="맑은 고딕" charset="0"/>
                 <a:ea typeface="맑은 고딕" charset="0"/>
               </a:rPr>
-              <a:t>2022-06-16</a:t>
+              <a:t>2022-06-20</a:t>
             </a:fld>
             <a:endParaRPr lang="ko-KR" altLang="en-US">
               <a:solidFill>
@@ -4061,7 +4051,7 @@
                 <a:latin typeface="맑은 고딕" charset="0"/>
                 <a:ea typeface="맑은 고딕" charset="0"/>
               </a:rPr>
-              <a:t>2022-06-16</a:t>
+              <a:t>2022-06-20</a:t>
             </a:fld>
             <a:endParaRPr lang="ko-KR" altLang="en-US">
               <a:solidFill>
@@ -4378,7 +4368,7 @@
                 </a:solidFill>
               </a:rPr>
               <a:pPr/>
-              <a:t>2022-06-16</a:t>
+              <a:t>2022-06-20</a:t>
             </a:fld>
             <a:endParaRPr lang="ko-KR" altLang="en-US">
               <a:solidFill>
@@ -4675,7 +4665,7 @@
                 </a:solidFill>
               </a:rPr>
               <a:pPr/>
-              <a:t>2022-06-16</a:t>
+              <a:t>2022-06-20</a:t>
             </a:fld>
             <a:endParaRPr lang="ko-KR" altLang="en-US">
               <a:solidFill>
@@ -5119,7 +5109,7 @@
                 </a:solidFill>
               </a:rPr>
               <a:pPr/>
-              <a:t>2022-06-16</a:t>
+              <a:t>2022-06-20</a:t>
             </a:fld>
             <a:endParaRPr lang="ko-KR" altLang="en-US">
               <a:solidFill>
@@ -5292,7 +5282,7 @@
                 </a:solidFill>
               </a:rPr>
               <a:pPr/>
-              <a:t>2022-06-16</a:t>
+              <a:t>2022-06-20</a:t>
             </a:fld>
             <a:endParaRPr lang="ko-KR" altLang="en-US">
               <a:solidFill>
@@ -5437,7 +5427,7 @@
                 </a:solidFill>
               </a:rPr>
               <a:pPr/>
-              <a:t>2022-06-16</a:t>
+              <a:t>2022-06-20</a:t>
             </a:fld>
             <a:endParaRPr lang="ko-KR" altLang="en-US">
               <a:solidFill>
@@ -6806,7 +6796,7 @@
                 </a:solidFill>
               </a:rPr>
               <a:pPr/>
-              <a:t>2022-06-16</a:t>
+              <a:t>2022-06-20</a:t>
             </a:fld>
             <a:endParaRPr lang="ko-KR" altLang="en-US">
               <a:solidFill>
@@ -7126,7 +7116,7 @@
                 </a:solidFill>
               </a:rPr>
               <a:pPr/>
-              <a:t>2022-06-16</a:t>
+              <a:t>2022-06-20</a:t>
             </a:fld>
             <a:endParaRPr lang="ko-KR" altLang="en-US">
               <a:solidFill>
@@ -7399,7 +7389,7 @@
                 </a:solidFill>
               </a:rPr>
               <a:pPr/>
-              <a:t>2022-06-16</a:t>
+              <a:t>2022-06-20</a:t>
             </a:fld>
             <a:endParaRPr lang="ko-KR" altLang="en-US">
               <a:solidFill>
@@ -8000,7 +7990,7 @@
                 <a:latin typeface="맑은 고딕" charset="0"/>
                 <a:ea typeface="맑은 고딕" charset="0"/>
               </a:rPr>
-              <a:t>2022-06-16</a:t>
+              <a:t>2022-06-20</a:t>
             </a:fld>
             <a:endParaRPr lang="ko-KR" altLang="en-US">
               <a:solidFill>
@@ -8274,1756 +8264,6 @@
 </p:sld>
 </file>
 
-<file path=ppt/slides/slide10.xml><?xml version="1.0" encoding="utf-8"?>
-<p:sld xmlns:a="http://schemas.openxmlformats.org/drawingml/2006/main" xmlns:r="http://schemas.openxmlformats.org/officeDocument/2006/relationships" xmlns:p="http://schemas.openxmlformats.org/presentationml/2006/main">
-  <p:cSld>
-    <p:spTree>
-      <p:nvGrpSpPr>
-        <p:cNvPr id="1" name=""/>
-        <p:cNvGrpSpPr/>
-        <p:nvPr/>
-      </p:nvGrpSpPr>
-      <p:grpSpPr>
-        <a:xfrm>
-          <a:off x="0" y="0"/>
-          <a:ext cx="0" cy="0"/>
-          <a:chOff x="0" y="0"/>
-          <a:chExt cx="0" cy="0"/>
-        </a:xfrm>
-      </p:grpSpPr>
-      <p:sp>
-        <p:nvSpPr>
-          <p:cNvPr id="44" name="도형 17"/>
-          <p:cNvSpPr>
-            <a:spLocks/>
-          </p:cNvSpPr>
-          <p:nvPr/>
-        </p:nvSpPr>
-        <p:spPr>
-          <a:xfrm>
-            <a:off x="765868" y="316230"/>
-            <a:ext cx="1074333" cy="454292"/>
-          </a:xfrm>
-          <a:prstGeom prst="rect">
-            <a:avLst/>
-          </a:prstGeom>
-          <a:ln w="0">
-            <a:noFill/>
-            <a:prstDash/>
-          </a:ln>
-        </p:spPr>
-        <p:txBody>
-          <a:bodyPr vert="horz" wrap="none" lIns="91440" tIns="45720" rIns="91440" bIns="45720" numCol="1" anchor="t">
-            <a:spAutoFit/>
-          </a:bodyPr>
-          <a:lstStyle/>
-          <a:p>
-            <a:pPr marL="0" indent="0" latinLnBrk="0">
-              <a:lnSpc>
-                <a:spcPct val="150000"/>
-              </a:lnSpc>
-              <a:buFontTx/>
-              <a:buNone/>
-            </a:pPr>
-            <a:r>
-              <a:rPr lang="en-US" altLang="ko-KR" dirty="0" err="1" smtClean="0">
-                <a:solidFill>
-                  <a:schemeClr val="bg1"/>
-                </a:solidFill>
-              </a:rPr>
-              <a:t>MariaDB</a:t>
-            </a:r>
-            <a:endParaRPr lang="ko-KR" altLang="en-US" dirty="0">
-              <a:solidFill>
-                <a:schemeClr val="bg1"/>
-              </a:solidFill>
-            </a:endParaRPr>
-          </a:p>
-        </p:txBody>
-      </p:sp>
-      <p:sp>
-        <p:nvSpPr>
-          <p:cNvPr id="7" name="내용 개체 틀 2"/>
-          <p:cNvSpPr txBox="1">
-            <a:spLocks/>
-          </p:cNvSpPr>
-          <p:nvPr/>
-        </p:nvSpPr>
-        <p:spPr>
-          <a:xfrm>
-            <a:off x="457200" y="1334192"/>
-            <a:ext cx="11222182" cy="4525963"/>
-          </a:xfrm>
-          <a:prstGeom prst="rect">
-            <a:avLst/>
-          </a:prstGeom>
-        </p:spPr>
-        <p:txBody>
-          <a:bodyPr/>
-          <a:lstStyle>
-            <a:lvl1pPr marL="228600" indent="-228600" algn="l" defTabSz="914400" rtl="0" eaLnBrk="1" latinLnBrk="1" hangingPunct="1">
-              <a:lnSpc>
-                <a:spcPct val="90000"/>
-              </a:lnSpc>
-              <a:spcBef>
-                <a:spcPts val="1000"/>
-              </a:spcBef>
-              <a:buFont typeface="Arial" panose="020B0604020202020204" pitchFamily="34" charset="0"/>
-              <a:buChar char="•"/>
-              <a:defRPr sz="2800" kern="1200">
-                <a:solidFill>
-                  <a:schemeClr val="tx1"/>
-                </a:solidFill>
-                <a:latin typeface="+mn-lt"/>
-                <a:ea typeface="+mn-ea"/>
-                <a:cs typeface="+mn-cs"/>
-              </a:defRPr>
-            </a:lvl1pPr>
-            <a:lvl2pPr marL="685800" indent="-228600" algn="l" defTabSz="914400" rtl="0" eaLnBrk="1" latinLnBrk="1" hangingPunct="1">
-              <a:lnSpc>
-                <a:spcPct val="90000"/>
-              </a:lnSpc>
-              <a:spcBef>
-                <a:spcPts val="500"/>
-              </a:spcBef>
-              <a:buFont typeface="Arial" panose="020B0604020202020204" pitchFamily="34" charset="0"/>
-              <a:buChar char="•"/>
-              <a:defRPr sz="2400" kern="1200">
-                <a:solidFill>
-                  <a:schemeClr val="tx1"/>
-                </a:solidFill>
-                <a:latin typeface="+mn-lt"/>
-                <a:ea typeface="+mn-ea"/>
-                <a:cs typeface="+mn-cs"/>
-              </a:defRPr>
-            </a:lvl2pPr>
-            <a:lvl3pPr marL="1143000" indent="-228600" algn="l" defTabSz="914400" rtl="0" eaLnBrk="1" latinLnBrk="1" hangingPunct="1">
-              <a:lnSpc>
-                <a:spcPct val="90000"/>
-              </a:lnSpc>
-              <a:spcBef>
-                <a:spcPts val="500"/>
-              </a:spcBef>
-              <a:buFont typeface="Arial" panose="020B0604020202020204" pitchFamily="34" charset="0"/>
-              <a:buChar char="•"/>
-              <a:defRPr sz="2000" kern="1200">
-                <a:solidFill>
-                  <a:schemeClr val="tx1"/>
-                </a:solidFill>
-                <a:latin typeface="+mn-lt"/>
-                <a:ea typeface="+mn-ea"/>
-                <a:cs typeface="+mn-cs"/>
-              </a:defRPr>
-            </a:lvl3pPr>
-            <a:lvl4pPr marL="1600200" indent="-228600" algn="l" defTabSz="914400" rtl="0" eaLnBrk="1" latinLnBrk="1" hangingPunct="1">
-              <a:lnSpc>
-                <a:spcPct val="90000"/>
-              </a:lnSpc>
-              <a:spcBef>
-                <a:spcPts val="500"/>
-              </a:spcBef>
-              <a:buFont typeface="Arial" panose="020B0604020202020204" pitchFamily="34" charset="0"/>
-              <a:buChar char="•"/>
-              <a:defRPr sz="1800" kern="1200">
-                <a:solidFill>
-                  <a:schemeClr val="tx1"/>
-                </a:solidFill>
-                <a:latin typeface="+mn-lt"/>
-                <a:ea typeface="+mn-ea"/>
-                <a:cs typeface="+mn-cs"/>
-              </a:defRPr>
-            </a:lvl4pPr>
-            <a:lvl5pPr marL="2057400" indent="-228600" algn="l" defTabSz="914400" rtl="0" eaLnBrk="1" latinLnBrk="1" hangingPunct="1">
-              <a:lnSpc>
-                <a:spcPct val="90000"/>
-              </a:lnSpc>
-              <a:spcBef>
-                <a:spcPts val="500"/>
-              </a:spcBef>
-              <a:buFont typeface="Arial" panose="020B0604020202020204" pitchFamily="34" charset="0"/>
-              <a:buChar char="•"/>
-              <a:defRPr sz="1800" kern="1200">
-                <a:solidFill>
-                  <a:schemeClr val="tx1"/>
-                </a:solidFill>
-                <a:latin typeface="+mn-lt"/>
-                <a:ea typeface="+mn-ea"/>
-                <a:cs typeface="+mn-cs"/>
-              </a:defRPr>
-            </a:lvl5pPr>
-            <a:lvl6pPr marL="2514600" indent="-228600" algn="l" defTabSz="914400" rtl="0" eaLnBrk="1" latinLnBrk="1" hangingPunct="1">
-              <a:lnSpc>
-                <a:spcPct val="90000"/>
-              </a:lnSpc>
-              <a:spcBef>
-                <a:spcPts val="500"/>
-              </a:spcBef>
-              <a:buFont typeface="Arial" panose="020B0604020202020204" pitchFamily="34" charset="0"/>
-              <a:buChar char="•"/>
-              <a:defRPr sz="1800" kern="1200">
-                <a:solidFill>
-                  <a:schemeClr val="tx1"/>
-                </a:solidFill>
-                <a:latin typeface="+mn-lt"/>
-                <a:ea typeface="+mn-ea"/>
-                <a:cs typeface="+mn-cs"/>
-              </a:defRPr>
-            </a:lvl6pPr>
-            <a:lvl7pPr marL="2971800" indent="-228600" algn="l" defTabSz="914400" rtl="0" eaLnBrk="1" latinLnBrk="1" hangingPunct="1">
-              <a:lnSpc>
-                <a:spcPct val="90000"/>
-              </a:lnSpc>
-              <a:spcBef>
-                <a:spcPts val="500"/>
-              </a:spcBef>
-              <a:buFont typeface="Arial" panose="020B0604020202020204" pitchFamily="34" charset="0"/>
-              <a:buChar char="•"/>
-              <a:defRPr sz="1800" kern="1200">
-                <a:solidFill>
-                  <a:schemeClr val="tx1"/>
-                </a:solidFill>
-                <a:latin typeface="+mn-lt"/>
-                <a:ea typeface="+mn-ea"/>
-                <a:cs typeface="+mn-cs"/>
-              </a:defRPr>
-            </a:lvl7pPr>
-            <a:lvl8pPr marL="3429000" indent="-228600" algn="l" defTabSz="914400" rtl="0" eaLnBrk="1" latinLnBrk="1" hangingPunct="1">
-              <a:lnSpc>
-                <a:spcPct val="90000"/>
-              </a:lnSpc>
-              <a:spcBef>
-                <a:spcPts val="500"/>
-              </a:spcBef>
-              <a:buFont typeface="Arial" panose="020B0604020202020204" pitchFamily="34" charset="0"/>
-              <a:buChar char="•"/>
-              <a:defRPr sz="1800" kern="1200">
-                <a:solidFill>
-                  <a:schemeClr val="tx1"/>
-                </a:solidFill>
-                <a:latin typeface="+mn-lt"/>
-                <a:ea typeface="+mn-ea"/>
-                <a:cs typeface="+mn-cs"/>
-              </a:defRPr>
-            </a:lvl8pPr>
-            <a:lvl9pPr marL="3886200" indent="-228600" algn="l" defTabSz="914400" rtl="0" eaLnBrk="1" latinLnBrk="1" hangingPunct="1">
-              <a:lnSpc>
-                <a:spcPct val="90000"/>
-              </a:lnSpc>
-              <a:spcBef>
-                <a:spcPts val="500"/>
-              </a:spcBef>
-              <a:buFont typeface="Arial" panose="020B0604020202020204" pitchFamily="34" charset="0"/>
-              <a:buChar char="•"/>
-              <a:defRPr sz="1800" kern="1200">
-                <a:solidFill>
-                  <a:schemeClr val="tx1"/>
-                </a:solidFill>
-                <a:latin typeface="+mn-lt"/>
-                <a:ea typeface="+mn-ea"/>
-                <a:cs typeface="+mn-cs"/>
-              </a:defRPr>
-            </a:lvl9pPr>
-          </a:lstStyle>
-          <a:p>
-            <a:pPr marL="0" indent="0">
-              <a:lnSpc>
-                <a:spcPct val="150000"/>
-              </a:lnSpc>
-              <a:buNone/>
-            </a:pPr>
-            <a:r>
-              <a:rPr lang="ko-KR" altLang="en-US" dirty="0" smtClean="0"/>
-              <a:t>다운로드 및 설치</a:t>
-            </a:r>
-            <a:endParaRPr lang="en-US" altLang="ko-KR" dirty="0" smtClean="0"/>
-          </a:p>
-        </p:txBody>
-      </p:sp>
-      <p:pic>
-        <p:nvPicPr>
-          <p:cNvPr id="4" name="그림 3"/>
-          <p:cNvPicPr>
-            <a:picLocks noChangeAspect="1"/>
-          </p:cNvPicPr>
-          <p:nvPr/>
-        </p:nvPicPr>
-        <p:blipFill>
-          <a:blip r:embed="rId2"/>
-          <a:stretch>
-            <a:fillRect/>
-          </a:stretch>
-        </p:blipFill>
-        <p:spPr>
-          <a:xfrm>
-            <a:off x="457200" y="2173980"/>
-            <a:ext cx="4714875" cy="3686175"/>
-          </a:xfrm>
-          <a:prstGeom prst="rect">
-            <a:avLst/>
-          </a:prstGeom>
-        </p:spPr>
-      </p:pic>
-      <p:sp>
-        <p:nvSpPr>
-          <p:cNvPr id="8" name="직사각형 7"/>
-          <p:cNvSpPr/>
-          <p:nvPr/>
-        </p:nvSpPr>
-        <p:spPr>
-          <a:xfrm>
-            <a:off x="3362912" y="5408205"/>
-            <a:ext cx="914400" cy="451950"/>
-          </a:xfrm>
-          <a:prstGeom prst="rect">
-            <a:avLst/>
-          </a:prstGeom>
-          <a:noFill/>
-          <a:ln w="28575">
-            <a:solidFill>
-              <a:srgbClr val="FF0000"/>
-            </a:solidFill>
-          </a:ln>
-        </p:spPr>
-        <p:style>
-          <a:lnRef idx="2">
-            <a:schemeClr val="accent1">
-              <a:shade val="50000"/>
-            </a:schemeClr>
-          </a:lnRef>
-          <a:fillRef idx="1">
-            <a:schemeClr val="accent1"/>
-          </a:fillRef>
-          <a:effectRef idx="0">
-            <a:schemeClr val="accent1"/>
-          </a:effectRef>
-          <a:fontRef idx="minor">
-            <a:schemeClr val="lt1"/>
-          </a:fontRef>
-        </p:style>
-        <p:txBody>
-          <a:bodyPr rtlCol="0" anchor="ctr"/>
-          <a:lstStyle/>
-          <a:p>
-            <a:pPr algn="ctr"/>
-            <a:endParaRPr lang="ko-KR" altLang="en-US"/>
-          </a:p>
-        </p:txBody>
-      </p:sp>
-      <p:pic>
-        <p:nvPicPr>
-          <p:cNvPr id="5" name="그림 4"/>
-          <p:cNvPicPr>
-            <a:picLocks noChangeAspect="1"/>
-          </p:cNvPicPr>
-          <p:nvPr/>
-        </p:nvPicPr>
-        <p:blipFill>
-          <a:blip r:embed="rId3"/>
-          <a:stretch>
-            <a:fillRect/>
-          </a:stretch>
-        </p:blipFill>
-        <p:spPr>
-          <a:xfrm>
-            <a:off x="3500568" y="1585912"/>
-            <a:ext cx="4714875" cy="3686175"/>
-          </a:xfrm>
-          <a:prstGeom prst="rect">
-            <a:avLst/>
-          </a:prstGeom>
-        </p:spPr>
-      </p:pic>
-      <p:sp>
-        <p:nvSpPr>
-          <p:cNvPr id="9" name="직사각형 8"/>
-          <p:cNvSpPr/>
-          <p:nvPr/>
-        </p:nvSpPr>
-        <p:spPr>
-          <a:xfrm>
-            <a:off x="6396740" y="4795147"/>
-            <a:ext cx="914400" cy="451950"/>
-          </a:xfrm>
-          <a:prstGeom prst="rect">
-            <a:avLst/>
-          </a:prstGeom>
-          <a:noFill/>
-          <a:ln w="28575">
-            <a:solidFill>
-              <a:srgbClr val="FF0000"/>
-            </a:solidFill>
-          </a:ln>
-        </p:spPr>
-        <p:style>
-          <a:lnRef idx="2">
-            <a:schemeClr val="accent1">
-              <a:shade val="50000"/>
-            </a:schemeClr>
-          </a:lnRef>
-          <a:fillRef idx="1">
-            <a:schemeClr val="accent1"/>
-          </a:fillRef>
-          <a:effectRef idx="0">
-            <a:schemeClr val="accent1"/>
-          </a:effectRef>
-          <a:fontRef idx="minor">
-            <a:schemeClr val="lt1"/>
-          </a:fontRef>
-        </p:style>
-        <p:txBody>
-          <a:bodyPr rtlCol="0" anchor="ctr"/>
-          <a:lstStyle/>
-          <a:p>
-            <a:pPr algn="ctr"/>
-            <a:endParaRPr lang="ko-KR" altLang="en-US"/>
-          </a:p>
-        </p:txBody>
-      </p:sp>
-    </p:spTree>
-    <p:extLst>
-      <p:ext uri="{BB962C8B-B14F-4D97-AF65-F5344CB8AC3E}">
-        <p14:creationId xmlns:p14="http://schemas.microsoft.com/office/powerpoint/2010/main" val="3995086111"/>
-      </p:ext>
-    </p:extLst>
-  </p:cSld>
-  <p:clrMapOvr>
-    <a:masterClrMapping/>
-  </p:clrMapOvr>
-</p:sld>
-</file>
-
-<file path=ppt/slides/slide11.xml><?xml version="1.0" encoding="utf-8"?>
-<p:sld xmlns:a="http://schemas.openxmlformats.org/drawingml/2006/main" xmlns:r="http://schemas.openxmlformats.org/officeDocument/2006/relationships" xmlns:p="http://schemas.openxmlformats.org/presentationml/2006/main">
-  <p:cSld>
-    <p:spTree>
-      <p:nvGrpSpPr>
-        <p:cNvPr id="1" name=""/>
-        <p:cNvGrpSpPr/>
-        <p:nvPr/>
-      </p:nvGrpSpPr>
-      <p:grpSpPr>
-        <a:xfrm>
-          <a:off x="0" y="0"/>
-          <a:ext cx="0" cy="0"/>
-          <a:chOff x="0" y="0"/>
-          <a:chExt cx="0" cy="0"/>
-        </a:xfrm>
-      </p:grpSpPr>
-      <p:sp>
-        <p:nvSpPr>
-          <p:cNvPr id="44" name="도형 17"/>
-          <p:cNvSpPr>
-            <a:spLocks/>
-          </p:cNvSpPr>
-          <p:nvPr/>
-        </p:nvSpPr>
-        <p:spPr>
-          <a:xfrm>
-            <a:off x="765868" y="316230"/>
-            <a:ext cx="1074333" cy="454292"/>
-          </a:xfrm>
-          <a:prstGeom prst="rect">
-            <a:avLst/>
-          </a:prstGeom>
-          <a:ln w="0">
-            <a:noFill/>
-            <a:prstDash/>
-          </a:ln>
-        </p:spPr>
-        <p:txBody>
-          <a:bodyPr vert="horz" wrap="none" lIns="91440" tIns="45720" rIns="91440" bIns="45720" numCol="1" anchor="t">
-            <a:spAutoFit/>
-          </a:bodyPr>
-          <a:lstStyle/>
-          <a:p>
-            <a:pPr marL="0" indent="0" latinLnBrk="0">
-              <a:lnSpc>
-                <a:spcPct val="150000"/>
-              </a:lnSpc>
-              <a:buFontTx/>
-              <a:buNone/>
-            </a:pPr>
-            <a:r>
-              <a:rPr lang="en-US" altLang="ko-KR" dirty="0" err="1" smtClean="0">
-                <a:solidFill>
-                  <a:schemeClr val="bg1"/>
-                </a:solidFill>
-              </a:rPr>
-              <a:t>MariaDB</a:t>
-            </a:r>
-            <a:endParaRPr lang="ko-KR" altLang="en-US" dirty="0">
-              <a:solidFill>
-                <a:schemeClr val="bg1"/>
-              </a:solidFill>
-            </a:endParaRPr>
-          </a:p>
-        </p:txBody>
-      </p:sp>
-      <p:sp>
-        <p:nvSpPr>
-          <p:cNvPr id="7" name="내용 개체 틀 2"/>
-          <p:cNvSpPr txBox="1">
-            <a:spLocks/>
-          </p:cNvSpPr>
-          <p:nvPr/>
-        </p:nvSpPr>
-        <p:spPr>
-          <a:xfrm>
-            <a:off x="457200" y="1334192"/>
-            <a:ext cx="11222182" cy="4525963"/>
-          </a:xfrm>
-          <a:prstGeom prst="rect">
-            <a:avLst/>
-          </a:prstGeom>
-        </p:spPr>
-        <p:txBody>
-          <a:bodyPr/>
-          <a:lstStyle>
-            <a:lvl1pPr marL="228600" indent="-228600" algn="l" defTabSz="914400" rtl="0" eaLnBrk="1" latinLnBrk="1" hangingPunct="1">
-              <a:lnSpc>
-                <a:spcPct val="90000"/>
-              </a:lnSpc>
-              <a:spcBef>
-                <a:spcPts val="1000"/>
-              </a:spcBef>
-              <a:buFont typeface="Arial" panose="020B0604020202020204" pitchFamily="34" charset="0"/>
-              <a:buChar char="•"/>
-              <a:defRPr sz="2800" kern="1200">
-                <a:solidFill>
-                  <a:schemeClr val="tx1"/>
-                </a:solidFill>
-                <a:latin typeface="+mn-lt"/>
-                <a:ea typeface="+mn-ea"/>
-                <a:cs typeface="+mn-cs"/>
-              </a:defRPr>
-            </a:lvl1pPr>
-            <a:lvl2pPr marL="685800" indent="-228600" algn="l" defTabSz="914400" rtl="0" eaLnBrk="1" latinLnBrk="1" hangingPunct="1">
-              <a:lnSpc>
-                <a:spcPct val="90000"/>
-              </a:lnSpc>
-              <a:spcBef>
-                <a:spcPts val="500"/>
-              </a:spcBef>
-              <a:buFont typeface="Arial" panose="020B0604020202020204" pitchFamily="34" charset="0"/>
-              <a:buChar char="•"/>
-              <a:defRPr sz="2400" kern="1200">
-                <a:solidFill>
-                  <a:schemeClr val="tx1"/>
-                </a:solidFill>
-                <a:latin typeface="+mn-lt"/>
-                <a:ea typeface="+mn-ea"/>
-                <a:cs typeface="+mn-cs"/>
-              </a:defRPr>
-            </a:lvl2pPr>
-            <a:lvl3pPr marL="1143000" indent="-228600" algn="l" defTabSz="914400" rtl="0" eaLnBrk="1" latinLnBrk="1" hangingPunct="1">
-              <a:lnSpc>
-                <a:spcPct val="90000"/>
-              </a:lnSpc>
-              <a:spcBef>
-                <a:spcPts val="500"/>
-              </a:spcBef>
-              <a:buFont typeface="Arial" panose="020B0604020202020204" pitchFamily="34" charset="0"/>
-              <a:buChar char="•"/>
-              <a:defRPr sz="2000" kern="1200">
-                <a:solidFill>
-                  <a:schemeClr val="tx1"/>
-                </a:solidFill>
-                <a:latin typeface="+mn-lt"/>
-                <a:ea typeface="+mn-ea"/>
-                <a:cs typeface="+mn-cs"/>
-              </a:defRPr>
-            </a:lvl3pPr>
-            <a:lvl4pPr marL="1600200" indent="-228600" algn="l" defTabSz="914400" rtl="0" eaLnBrk="1" latinLnBrk="1" hangingPunct="1">
-              <a:lnSpc>
-                <a:spcPct val="90000"/>
-              </a:lnSpc>
-              <a:spcBef>
-                <a:spcPts val="500"/>
-              </a:spcBef>
-              <a:buFont typeface="Arial" panose="020B0604020202020204" pitchFamily="34" charset="0"/>
-              <a:buChar char="•"/>
-              <a:defRPr sz="1800" kern="1200">
-                <a:solidFill>
-                  <a:schemeClr val="tx1"/>
-                </a:solidFill>
-                <a:latin typeface="+mn-lt"/>
-                <a:ea typeface="+mn-ea"/>
-                <a:cs typeface="+mn-cs"/>
-              </a:defRPr>
-            </a:lvl4pPr>
-            <a:lvl5pPr marL="2057400" indent="-228600" algn="l" defTabSz="914400" rtl="0" eaLnBrk="1" latinLnBrk="1" hangingPunct="1">
-              <a:lnSpc>
-                <a:spcPct val="90000"/>
-              </a:lnSpc>
-              <a:spcBef>
-                <a:spcPts val="500"/>
-              </a:spcBef>
-              <a:buFont typeface="Arial" panose="020B0604020202020204" pitchFamily="34" charset="0"/>
-              <a:buChar char="•"/>
-              <a:defRPr sz="1800" kern="1200">
-                <a:solidFill>
-                  <a:schemeClr val="tx1"/>
-                </a:solidFill>
-                <a:latin typeface="+mn-lt"/>
-                <a:ea typeface="+mn-ea"/>
-                <a:cs typeface="+mn-cs"/>
-              </a:defRPr>
-            </a:lvl5pPr>
-            <a:lvl6pPr marL="2514600" indent="-228600" algn="l" defTabSz="914400" rtl="0" eaLnBrk="1" latinLnBrk="1" hangingPunct="1">
-              <a:lnSpc>
-                <a:spcPct val="90000"/>
-              </a:lnSpc>
-              <a:spcBef>
-                <a:spcPts val="500"/>
-              </a:spcBef>
-              <a:buFont typeface="Arial" panose="020B0604020202020204" pitchFamily="34" charset="0"/>
-              <a:buChar char="•"/>
-              <a:defRPr sz="1800" kern="1200">
-                <a:solidFill>
-                  <a:schemeClr val="tx1"/>
-                </a:solidFill>
-                <a:latin typeface="+mn-lt"/>
-                <a:ea typeface="+mn-ea"/>
-                <a:cs typeface="+mn-cs"/>
-              </a:defRPr>
-            </a:lvl6pPr>
-            <a:lvl7pPr marL="2971800" indent="-228600" algn="l" defTabSz="914400" rtl="0" eaLnBrk="1" latinLnBrk="1" hangingPunct="1">
-              <a:lnSpc>
-                <a:spcPct val="90000"/>
-              </a:lnSpc>
-              <a:spcBef>
-                <a:spcPts val="500"/>
-              </a:spcBef>
-              <a:buFont typeface="Arial" panose="020B0604020202020204" pitchFamily="34" charset="0"/>
-              <a:buChar char="•"/>
-              <a:defRPr sz="1800" kern="1200">
-                <a:solidFill>
-                  <a:schemeClr val="tx1"/>
-                </a:solidFill>
-                <a:latin typeface="+mn-lt"/>
-                <a:ea typeface="+mn-ea"/>
-                <a:cs typeface="+mn-cs"/>
-              </a:defRPr>
-            </a:lvl7pPr>
-            <a:lvl8pPr marL="3429000" indent="-228600" algn="l" defTabSz="914400" rtl="0" eaLnBrk="1" latinLnBrk="1" hangingPunct="1">
-              <a:lnSpc>
-                <a:spcPct val="90000"/>
-              </a:lnSpc>
-              <a:spcBef>
-                <a:spcPts val="500"/>
-              </a:spcBef>
-              <a:buFont typeface="Arial" panose="020B0604020202020204" pitchFamily="34" charset="0"/>
-              <a:buChar char="•"/>
-              <a:defRPr sz="1800" kern="1200">
-                <a:solidFill>
-                  <a:schemeClr val="tx1"/>
-                </a:solidFill>
-                <a:latin typeface="+mn-lt"/>
-                <a:ea typeface="+mn-ea"/>
-                <a:cs typeface="+mn-cs"/>
-              </a:defRPr>
-            </a:lvl8pPr>
-            <a:lvl9pPr marL="3886200" indent="-228600" algn="l" defTabSz="914400" rtl="0" eaLnBrk="1" latinLnBrk="1" hangingPunct="1">
-              <a:lnSpc>
-                <a:spcPct val="90000"/>
-              </a:lnSpc>
-              <a:spcBef>
-                <a:spcPts val="500"/>
-              </a:spcBef>
-              <a:buFont typeface="Arial" panose="020B0604020202020204" pitchFamily="34" charset="0"/>
-              <a:buChar char="•"/>
-              <a:defRPr sz="1800" kern="1200">
-                <a:solidFill>
-                  <a:schemeClr val="tx1"/>
-                </a:solidFill>
-                <a:latin typeface="+mn-lt"/>
-                <a:ea typeface="+mn-ea"/>
-                <a:cs typeface="+mn-cs"/>
-              </a:defRPr>
-            </a:lvl9pPr>
-          </a:lstStyle>
-          <a:p>
-            <a:pPr marL="0" indent="0">
-              <a:lnSpc>
-                <a:spcPct val="150000"/>
-              </a:lnSpc>
-              <a:buNone/>
-            </a:pPr>
-            <a:r>
-              <a:rPr lang="ko-KR" altLang="en-US" dirty="0" smtClean="0"/>
-              <a:t>다운로드 및 설치</a:t>
-            </a:r>
-            <a:endParaRPr lang="en-US" altLang="ko-KR" dirty="0" smtClean="0"/>
-          </a:p>
-        </p:txBody>
-      </p:sp>
-      <p:pic>
-        <p:nvPicPr>
-          <p:cNvPr id="2" name="그림 1"/>
-          <p:cNvPicPr>
-            <a:picLocks noChangeAspect="1"/>
-          </p:cNvPicPr>
-          <p:nvPr/>
-        </p:nvPicPr>
-        <p:blipFill>
-          <a:blip r:embed="rId2"/>
-          <a:stretch>
-            <a:fillRect/>
-          </a:stretch>
-        </p:blipFill>
-        <p:spPr>
-          <a:xfrm>
-            <a:off x="765868" y="2500312"/>
-            <a:ext cx="4714875" cy="3686175"/>
-          </a:xfrm>
-          <a:prstGeom prst="rect">
-            <a:avLst/>
-          </a:prstGeom>
-        </p:spPr>
-      </p:pic>
-      <p:sp>
-        <p:nvSpPr>
-          <p:cNvPr id="10" name="직사각형 9"/>
-          <p:cNvSpPr/>
-          <p:nvPr/>
-        </p:nvSpPr>
-        <p:spPr>
-          <a:xfrm>
-            <a:off x="3803853" y="5682111"/>
-            <a:ext cx="914400" cy="451950"/>
-          </a:xfrm>
-          <a:prstGeom prst="rect">
-            <a:avLst/>
-          </a:prstGeom>
-          <a:noFill/>
-          <a:ln w="28575">
-            <a:solidFill>
-              <a:srgbClr val="FF0000"/>
-            </a:solidFill>
-          </a:ln>
-        </p:spPr>
-        <p:style>
-          <a:lnRef idx="2">
-            <a:schemeClr val="accent1">
-              <a:shade val="50000"/>
-            </a:schemeClr>
-          </a:lnRef>
-          <a:fillRef idx="1">
-            <a:schemeClr val="accent1"/>
-          </a:fillRef>
-          <a:effectRef idx="0">
-            <a:schemeClr val="accent1"/>
-          </a:effectRef>
-          <a:fontRef idx="minor">
-            <a:schemeClr val="lt1"/>
-          </a:fontRef>
-        </p:style>
-        <p:txBody>
-          <a:bodyPr rtlCol="0" anchor="ctr"/>
-          <a:lstStyle/>
-          <a:p>
-            <a:pPr algn="ctr"/>
-            <a:endParaRPr lang="ko-KR" altLang="en-US"/>
-          </a:p>
-        </p:txBody>
-      </p:sp>
-      <p:pic>
-        <p:nvPicPr>
-          <p:cNvPr id="3" name="그림 2"/>
-          <p:cNvPicPr>
-            <a:picLocks noChangeAspect="1"/>
-          </p:cNvPicPr>
-          <p:nvPr/>
-        </p:nvPicPr>
-        <p:blipFill>
-          <a:blip r:embed="rId3"/>
-          <a:stretch>
-            <a:fillRect/>
-          </a:stretch>
-        </p:blipFill>
-        <p:spPr>
-          <a:xfrm>
-            <a:off x="4452545" y="1754085"/>
-            <a:ext cx="4714875" cy="3686175"/>
-          </a:xfrm>
-          <a:prstGeom prst="rect">
-            <a:avLst/>
-          </a:prstGeom>
-        </p:spPr>
-      </p:pic>
-      <p:sp>
-        <p:nvSpPr>
-          <p:cNvPr id="11" name="직사각형 10"/>
-          <p:cNvSpPr/>
-          <p:nvPr/>
-        </p:nvSpPr>
-        <p:spPr>
-          <a:xfrm>
-            <a:off x="5673151" y="2906038"/>
-            <a:ext cx="1366475" cy="751561"/>
-          </a:xfrm>
-          <a:prstGeom prst="rect">
-            <a:avLst/>
-          </a:prstGeom>
-          <a:noFill/>
-          <a:ln w="28575">
-            <a:solidFill>
-              <a:srgbClr val="FF0000"/>
-            </a:solidFill>
-          </a:ln>
-        </p:spPr>
-        <p:style>
-          <a:lnRef idx="2">
-            <a:schemeClr val="accent1">
-              <a:shade val="50000"/>
-            </a:schemeClr>
-          </a:lnRef>
-          <a:fillRef idx="1">
-            <a:schemeClr val="accent1"/>
-          </a:fillRef>
-          <a:effectRef idx="0">
-            <a:schemeClr val="accent1"/>
-          </a:effectRef>
-          <a:fontRef idx="minor">
-            <a:schemeClr val="lt1"/>
-          </a:fontRef>
-        </p:style>
-        <p:txBody>
-          <a:bodyPr rtlCol="0" anchor="ctr"/>
-          <a:lstStyle/>
-          <a:p>
-            <a:pPr algn="ctr"/>
-            <a:endParaRPr lang="ko-KR" altLang="en-US"/>
-          </a:p>
-        </p:txBody>
-      </p:sp>
-      <p:sp>
-        <p:nvSpPr>
-          <p:cNvPr id="12" name="직사각형 11"/>
-          <p:cNvSpPr/>
-          <p:nvPr/>
-        </p:nvSpPr>
-        <p:spPr>
-          <a:xfrm>
-            <a:off x="7350807" y="4982191"/>
-            <a:ext cx="914400" cy="451950"/>
-          </a:xfrm>
-          <a:prstGeom prst="rect">
-            <a:avLst/>
-          </a:prstGeom>
-          <a:noFill/>
-          <a:ln w="28575">
-            <a:solidFill>
-              <a:srgbClr val="FF0000"/>
-            </a:solidFill>
-          </a:ln>
-        </p:spPr>
-        <p:style>
-          <a:lnRef idx="2">
-            <a:schemeClr val="accent1">
-              <a:shade val="50000"/>
-            </a:schemeClr>
-          </a:lnRef>
-          <a:fillRef idx="1">
-            <a:schemeClr val="accent1"/>
-          </a:fillRef>
-          <a:effectRef idx="0">
-            <a:schemeClr val="accent1"/>
-          </a:effectRef>
-          <a:fontRef idx="minor">
-            <a:schemeClr val="lt1"/>
-          </a:fontRef>
-        </p:style>
-        <p:txBody>
-          <a:bodyPr rtlCol="0" anchor="ctr"/>
-          <a:lstStyle/>
-          <a:p>
-            <a:pPr algn="ctr"/>
-            <a:endParaRPr lang="ko-KR" altLang="en-US"/>
-          </a:p>
-        </p:txBody>
-      </p:sp>
-      <p:pic>
-        <p:nvPicPr>
-          <p:cNvPr id="6" name="그림 5"/>
-          <p:cNvPicPr>
-            <a:picLocks noChangeAspect="1"/>
-          </p:cNvPicPr>
-          <p:nvPr/>
-        </p:nvPicPr>
-        <p:blipFill>
-          <a:blip r:embed="rId4"/>
-          <a:stretch>
-            <a:fillRect/>
-          </a:stretch>
-        </p:blipFill>
-        <p:spPr>
-          <a:xfrm>
-            <a:off x="7156915" y="1086069"/>
-            <a:ext cx="4714875" cy="3686175"/>
-          </a:xfrm>
-          <a:prstGeom prst="rect">
-            <a:avLst/>
-          </a:prstGeom>
-        </p:spPr>
-      </p:pic>
-      <p:sp>
-        <p:nvSpPr>
-          <p:cNvPr id="14" name="직사각형 13"/>
-          <p:cNvSpPr/>
-          <p:nvPr/>
-        </p:nvSpPr>
-        <p:spPr>
-          <a:xfrm>
-            <a:off x="10053883" y="4307701"/>
-            <a:ext cx="914400" cy="451950"/>
-          </a:xfrm>
-          <a:prstGeom prst="rect">
-            <a:avLst/>
-          </a:prstGeom>
-          <a:noFill/>
-          <a:ln w="28575">
-            <a:solidFill>
-              <a:srgbClr val="FF0000"/>
-            </a:solidFill>
-          </a:ln>
-        </p:spPr>
-        <p:style>
-          <a:lnRef idx="2">
-            <a:schemeClr val="accent1">
-              <a:shade val="50000"/>
-            </a:schemeClr>
-          </a:lnRef>
-          <a:fillRef idx="1">
-            <a:schemeClr val="accent1"/>
-          </a:fillRef>
-          <a:effectRef idx="0">
-            <a:schemeClr val="accent1"/>
-          </a:effectRef>
-          <a:fontRef idx="minor">
-            <a:schemeClr val="lt1"/>
-          </a:fontRef>
-        </p:style>
-        <p:txBody>
-          <a:bodyPr rtlCol="0" anchor="ctr"/>
-          <a:lstStyle/>
-          <a:p>
-            <a:pPr algn="ctr"/>
-            <a:endParaRPr lang="ko-KR" altLang="en-US"/>
-          </a:p>
-        </p:txBody>
-      </p:sp>
-    </p:spTree>
-    <p:extLst>
-      <p:ext uri="{BB962C8B-B14F-4D97-AF65-F5344CB8AC3E}">
-        <p14:creationId xmlns:p14="http://schemas.microsoft.com/office/powerpoint/2010/main" val="418524448"/>
-      </p:ext>
-    </p:extLst>
-  </p:cSld>
-  <p:clrMapOvr>
-    <a:masterClrMapping/>
-  </p:clrMapOvr>
-</p:sld>
-</file>
-
-<file path=ppt/slides/slide12.xml><?xml version="1.0" encoding="utf-8"?>
-<p:sld xmlns:a="http://schemas.openxmlformats.org/drawingml/2006/main" xmlns:r="http://schemas.openxmlformats.org/officeDocument/2006/relationships" xmlns:p="http://schemas.openxmlformats.org/presentationml/2006/main">
-  <p:cSld>
-    <p:spTree>
-      <p:nvGrpSpPr>
-        <p:cNvPr id="1" name=""/>
-        <p:cNvGrpSpPr/>
-        <p:nvPr/>
-      </p:nvGrpSpPr>
-      <p:grpSpPr>
-        <a:xfrm>
-          <a:off x="0" y="0"/>
-          <a:ext cx="0" cy="0"/>
-          <a:chOff x="0" y="0"/>
-          <a:chExt cx="0" cy="0"/>
-        </a:xfrm>
-      </p:grpSpPr>
-      <p:sp>
-        <p:nvSpPr>
-          <p:cNvPr id="44" name="도형 17"/>
-          <p:cNvSpPr>
-            <a:spLocks/>
-          </p:cNvSpPr>
-          <p:nvPr/>
-        </p:nvSpPr>
-        <p:spPr>
-          <a:xfrm>
-            <a:off x="765868" y="316230"/>
-            <a:ext cx="1074333" cy="454292"/>
-          </a:xfrm>
-          <a:prstGeom prst="rect">
-            <a:avLst/>
-          </a:prstGeom>
-          <a:ln w="0">
-            <a:noFill/>
-            <a:prstDash/>
-          </a:ln>
-        </p:spPr>
-        <p:txBody>
-          <a:bodyPr vert="horz" wrap="none" lIns="91440" tIns="45720" rIns="91440" bIns="45720" numCol="1" anchor="t">
-            <a:spAutoFit/>
-          </a:bodyPr>
-          <a:lstStyle/>
-          <a:p>
-            <a:pPr marL="0" indent="0" latinLnBrk="0">
-              <a:lnSpc>
-                <a:spcPct val="150000"/>
-              </a:lnSpc>
-              <a:buFontTx/>
-              <a:buNone/>
-            </a:pPr>
-            <a:r>
-              <a:rPr lang="en-US" altLang="ko-KR" dirty="0" err="1" smtClean="0">
-                <a:solidFill>
-                  <a:schemeClr val="bg1"/>
-                </a:solidFill>
-              </a:rPr>
-              <a:t>MariaDB</a:t>
-            </a:r>
-            <a:endParaRPr lang="ko-KR" altLang="en-US" dirty="0">
-              <a:solidFill>
-                <a:schemeClr val="bg1"/>
-              </a:solidFill>
-            </a:endParaRPr>
-          </a:p>
-        </p:txBody>
-      </p:sp>
-      <p:sp>
-        <p:nvSpPr>
-          <p:cNvPr id="7" name="내용 개체 틀 2"/>
-          <p:cNvSpPr txBox="1">
-            <a:spLocks/>
-          </p:cNvSpPr>
-          <p:nvPr/>
-        </p:nvSpPr>
-        <p:spPr>
-          <a:xfrm>
-            <a:off x="457200" y="1334192"/>
-            <a:ext cx="11222182" cy="4525963"/>
-          </a:xfrm>
-          <a:prstGeom prst="rect">
-            <a:avLst/>
-          </a:prstGeom>
-        </p:spPr>
-        <p:txBody>
-          <a:bodyPr/>
-          <a:lstStyle>
-            <a:lvl1pPr marL="228600" indent="-228600" algn="l" defTabSz="914400" rtl="0" eaLnBrk="1" latinLnBrk="1" hangingPunct="1">
-              <a:lnSpc>
-                <a:spcPct val="90000"/>
-              </a:lnSpc>
-              <a:spcBef>
-                <a:spcPts val="1000"/>
-              </a:spcBef>
-              <a:buFont typeface="Arial" panose="020B0604020202020204" pitchFamily="34" charset="0"/>
-              <a:buChar char="•"/>
-              <a:defRPr sz="2800" kern="1200">
-                <a:solidFill>
-                  <a:schemeClr val="tx1"/>
-                </a:solidFill>
-                <a:latin typeface="+mn-lt"/>
-                <a:ea typeface="+mn-ea"/>
-                <a:cs typeface="+mn-cs"/>
-              </a:defRPr>
-            </a:lvl1pPr>
-            <a:lvl2pPr marL="685800" indent="-228600" algn="l" defTabSz="914400" rtl="0" eaLnBrk="1" latinLnBrk="1" hangingPunct="1">
-              <a:lnSpc>
-                <a:spcPct val="90000"/>
-              </a:lnSpc>
-              <a:spcBef>
-                <a:spcPts val="500"/>
-              </a:spcBef>
-              <a:buFont typeface="Arial" panose="020B0604020202020204" pitchFamily="34" charset="0"/>
-              <a:buChar char="•"/>
-              <a:defRPr sz="2400" kern="1200">
-                <a:solidFill>
-                  <a:schemeClr val="tx1"/>
-                </a:solidFill>
-                <a:latin typeface="+mn-lt"/>
-                <a:ea typeface="+mn-ea"/>
-                <a:cs typeface="+mn-cs"/>
-              </a:defRPr>
-            </a:lvl2pPr>
-            <a:lvl3pPr marL="1143000" indent="-228600" algn="l" defTabSz="914400" rtl="0" eaLnBrk="1" latinLnBrk="1" hangingPunct="1">
-              <a:lnSpc>
-                <a:spcPct val="90000"/>
-              </a:lnSpc>
-              <a:spcBef>
-                <a:spcPts val="500"/>
-              </a:spcBef>
-              <a:buFont typeface="Arial" panose="020B0604020202020204" pitchFamily="34" charset="0"/>
-              <a:buChar char="•"/>
-              <a:defRPr sz="2000" kern="1200">
-                <a:solidFill>
-                  <a:schemeClr val="tx1"/>
-                </a:solidFill>
-                <a:latin typeface="+mn-lt"/>
-                <a:ea typeface="+mn-ea"/>
-                <a:cs typeface="+mn-cs"/>
-              </a:defRPr>
-            </a:lvl3pPr>
-            <a:lvl4pPr marL="1600200" indent="-228600" algn="l" defTabSz="914400" rtl="0" eaLnBrk="1" latinLnBrk="1" hangingPunct="1">
-              <a:lnSpc>
-                <a:spcPct val="90000"/>
-              </a:lnSpc>
-              <a:spcBef>
-                <a:spcPts val="500"/>
-              </a:spcBef>
-              <a:buFont typeface="Arial" panose="020B0604020202020204" pitchFamily="34" charset="0"/>
-              <a:buChar char="•"/>
-              <a:defRPr sz="1800" kern="1200">
-                <a:solidFill>
-                  <a:schemeClr val="tx1"/>
-                </a:solidFill>
-                <a:latin typeface="+mn-lt"/>
-                <a:ea typeface="+mn-ea"/>
-                <a:cs typeface="+mn-cs"/>
-              </a:defRPr>
-            </a:lvl4pPr>
-            <a:lvl5pPr marL="2057400" indent="-228600" algn="l" defTabSz="914400" rtl="0" eaLnBrk="1" latinLnBrk="1" hangingPunct="1">
-              <a:lnSpc>
-                <a:spcPct val="90000"/>
-              </a:lnSpc>
-              <a:spcBef>
-                <a:spcPts val="500"/>
-              </a:spcBef>
-              <a:buFont typeface="Arial" panose="020B0604020202020204" pitchFamily="34" charset="0"/>
-              <a:buChar char="•"/>
-              <a:defRPr sz="1800" kern="1200">
-                <a:solidFill>
-                  <a:schemeClr val="tx1"/>
-                </a:solidFill>
-                <a:latin typeface="+mn-lt"/>
-                <a:ea typeface="+mn-ea"/>
-                <a:cs typeface="+mn-cs"/>
-              </a:defRPr>
-            </a:lvl5pPr>
-            <a:lvl6pPr marL="2514600" indent="-228600" algn="l" defTabSz="914400" rtl="0" eaLnBrk="1" latinLnBrk="1" hangingPunct="1">
-              <a:lnSpc>
-                <a:spcPct val="90000"/>
-              </a:lnSpc>
-              <a:spcBef>
-                <a:spcPts val="500"/>
-              </a:spcBef>
-              <a:buFont typeface="Arial" panose="020B0604020202020204" pitchFamily="34" charset="0"/>
-              <a:buChar char="•"/>
-              <a:defRPr sz="1800" kern="1200">
-                <a:solidFill>
-                  <a:schemeClr val="tx1"/>
-                </a:solidFill>
-                <a:latin typeface="+mn-lt"/>
-                <a:ea typeface="+mn-ea"/>
-                <a:cs typeface="+mn-cs"/>
-              </a:defRPr>
-            </a:lvl6pPr>
-            <a:lvl7pPr marL="2971800" indent="-228600" algn="l" defTabSz="914400" rtl="0" eaLnBrk="1" latinLnBrk="1" hangingPunct="1">
-              <a:lnSpc>
-                <a:spcPct val="90000"/>
-              </a:lnSpc>
-              <a:spcBef>
-                <a:spcPts val="500"/>
-              </a:spcBef>
-              <a:buFont typeface="Arial" panose="020B0604020202020204" pitchFamily="34" charset="0"/>
-              <a:buChar char="•"/>
-              <a:defRPr sz="1800" kern="1200">
-                <a:solidFill>
-                  <a:schemeClr val="tx1"/>
-                </a:solidFill>
-                <a:latin typeface="+mn-lt"/>
-                <a:ea typeface="+mn-ea"/>
-                <a:cs typeface="+mn-cs"/>
-              </a:defRPr>
-            </a:lvl7pPr>
-            <a:lvl8pPr marL="3429000" indent="-228600" algn="l" defTabSz="914400" rtl="0" eaLnBrk="1" latinLnBrk="1" hangingPunct="1">
-              <a:lnSpc>
-                <a:spcPct val="90000"/>
-              </a:lnSpc>
-              <a:spcBef>
-                <a:spcPts val="500"/>
-              </a:spcBef>
-              <a:buFont typeface="Arial" panose="020B0604020202020204" pitchFamily="34" charset="0"/>
-              <a:buChar char="•"/>
-              <a:defRPr sz="1800" kern="1200">
-                <a:solidFill>
-                  <a:schemeClr val="tx1"/>
-                </a:solidFill>
-                <a:latin typeface="+mn-lt"/>
-                <a:ea typeface="+mn-ea"/>
-                <a:cs typeface="+mn-cs"/>
-              </a:defRPr>
-            </a:lvl8pPr>
-            <a:lvl9pPr marL="3886200" indent="-228600" algn="l" defTabSz="914400" rtl="0" eaLnBrk="1" latinLnBrk="1" hangingPunct="1">
-              <a:lnSpc>
-                <a:spcPct val="90000"/>
-              </a:lnSpc>
-              <a:spcBef>
-                <a:spcPts val="500"/>
-              </a:spcBef>
-              <a:buFont typeface="Arial" panose="020B0604020202020204" pitchFamily="34" charset="0"/>
-              <a:buChar char="•"/>
-              <a:defRPr sz="1800" kern="1200">
-                <a:solidFill>
-                  <a:schemeClr val="tx1"/>
-                </a:solidFill>
-                <a:latin typeface="+mn-lt"/>
-                <a:ea typeface="+mn-ea"/>
-                <a:cs typeface="+mn-cs"/>
-              </a:defRPr>
-            </a:lvl9pPr>
-          </a:lstStyle>
-          <a:p>
-            <a:pPr marL="0" indent="0">
-              <a:lnSpc>
-                <a:spcPct val="150000"/>
-              </a:lnSpc>
-              <a:buNone/>
-            </a:pPr>
-            <a:r>
-              <a:rPr lang="ko-KR" altLang="en-US" dirty="0" smtClean="0"/>
-              <a:t>다운로드 및 설치</a:t>
-            </a:r>
-            <a:endParaRPr lang="en-US" altLang="ko-KR" dirty="0" smtClean="0"/>
-          </a:p>
-        </p:txBody>
-      </p:sp>
-      <p:pic>
-        <p:nvPicPr>
-          <p:cNvPr id="4" name="그림 3"/>
-          <p:cNvPicPr>
-            <a:picLocks noChangeAspect="1"/>
-          </p:cNvPicPr>
-          <p:nvPr/>
-        </p:nvPicPr>
-        <p:blipFill>
-          <a:blip r:embed="rId2"/>
-          <a:stretch>
-            <a:fillRect/>
-          </a:stretch>
-        </p:blipFill>
-        <p:spPr>
-          <a:xfrm>
-            <a:off x="532355" y="2548843"/>
-            <a:ext cx="4714875" cy="3686175"/>
-          </a:xfrm>
-          <a:prstGeom prst="rect">
-            <a:avLst/>
-          </a:prstGeom>
-        </p:spPr>
-      </p:pic>
-      <p:sp>
-        <p:nvSpPr>
-          <p:cNvPr id="15" name="직사각형 14"/>
-          <p:cNvSpPr/>
-          <p:nvPr/>
-        </p:nvSpPr>
-        <p:spPr>
-          <a:xfrm>
-            <a:off x="3136878" y="5803414"/>
-            <a:ext cx="1157767" cy="451950"/>
-          </a:xfrm>
-          <a:prstGeom prst="rect">
-            <a:avLst/>
-          </a:prstGeom>
-          <a:noFill/>
-          <a:ln w="28575">
-            <a:solidFill>
-              <a:srgbClr val="FF0000"/>
-            </a:solidFill>
-          </a:ln>
-        </p:spPr>
-        <p:style>
-          <a:lnRef idx="2">
-            <a:schemeClr val="accent1">
-              <a:shade val="50000"/>
-            </a:schemeClr>
-          </a:lnRef>
-          <a:fillRef idx="1">
-            <a:schemeClr val="accent1"/>
-          </a:fillRef>
-          <a:effectRef idx="0">
-            <a:schemeClr val="accent1"/>
-          </a:effectRef>
-          <a:fontRef idx="minor">
-            <a:schemeClr val="lt1"/>
-          </a:fontRef>
-        </p:style>
-        <p:txBody>
-          <a:bodyPr rtlCol="0" anchor="ctr"/>
-          <a:lstStyle/>
-          <a:p>
-            <a:pPr algn="ctr"/>
-            <a:endParaRPr lang="ko-KR" altLang="en-US"/>
-          </a:p>
-        </p:txBody>
-      </p:sp>
-      <p:pic>
-        <p:nvPicPr>
-          <p:cNvPr id="5" name="그림 4"/>
-          <p:cNvPicPr>
-            <a:picLocks noChangeAspect="1"/>
-          </p:cNvPicPr>
-          <p:nvPr/>
-        </p:nvPicPr>
-        <p:blipFill>
-          <a:blip r:embed="rId3"/>
-          <a:stretch>
-            <a:fillRect/>
-          </a:stretch>
-        </p:blipFill>
-        <p:spPr>
-          <a:xfrm>
-            <a:off x="5494315" y="2343214"/>
-            <a:ext cx="4714875" cy="3686175"/>
-          </a:xfrm>
-          <a:prstGeom prst="rect">
-            <a:avLst/>
-          </a:prstGeom>
-        </p:spPr>
-      </p:pic>
-    </p:spTree>
-    <p:extLst>
-      <p:ext uri="{BB962C8B-B14F-4D97-AF65-F5344CB8AC3E}">
-        <p14:creationId xmlns:p14="http://schemas.microsoft.com/office/powerpoint/2010/main" val="2827072857"/>
-      </p:ext>
-    </p:extLst>
-  </p:cSld>
-  <p:clrMapOvr>
-    <a:masterClrMapping/>
-  </p:clrMapOvr>
-</p:sld>
-</file>
-
-<file path=ppt/slides/slide13.xml><?xml version="1.0" encoding="utf-8"?>
-<p:sld xmlns:a="http://schemas.openxmlformats.org/drawingml/2006/main" xmlns:r="http://schemas.openxmlformats.org/officeDocument/2006/relationships" xmlns:p="http://schemas.openxmlformats.org/presentationml/2006/main">
-  <p:cSld>
-    <p:spTree>
-      <p:nvGrpSpPr>
-        <p:cNvPr id="1" name=""/>
-        <p:cNvGrpSpPr/>
-        <p:nvPr/>
-      </p:nvGrpSpPr>
-      <p:grpSpPr>
-        <a:xfrm>
-          <a:off x="0" y="0"/>
-          <a:ext cx="0" cy="0"/>
-          <a:chOff x="0" y="0"/>
-          <a:chExt cx="0" cy="0"/>
-        </a:xfrm>
-      </p:grpSpPr>
-      <p:sp>
-        <p:nvSpPr>
-          <p:cNvPr id="44" name="도형 17"/>
-          <p:cNvSpPr>
-            <a:spLocks/>
-          </p:cNvSpPr>
-          <p:nvPr/>
-        </p:nvSpPr>
-        <p:spPr>
-          <a:xfrm>
-            <a:off x="765868" y="316230"/>
-            <a:ext cx="1074333" cy="454292"/>
-          </a:xfrm>
-          <a:prstGeom prst="rect">
-            <a:avLst/>
-          </a:prstGeom>
-          <a:ln w="0">
-            <a:noFill/>
-            <a:prstDash/>
-          </a:ln>
-        </p:spPr>
-        <p:txBody>
-          <a:bodyPr vert="horz" wrap="none" lIns="91440" tIns="45720" rIns="91440" bIns="45720" numCol="1" anchor="t">
-            <a:spAutoFit/>
-          </a:bodyPr>
-          <a:lstStyle/>
-          <a:p>
-            <a:pPr marL="0" indent="0" latinLnBrk="0">
-              <a:lnSpc>
-                <a:spcPct val="150000"/>
-              </a:lnSpc>
-              <a:buFontTx/>
-              <a:buNone/>
-            </a:pPr>
-            <a:r>
-              <a:rPr lang="en-US" altLang="ko-KR" dirty="0" err="1" smtClean="0">
-                <a:solidFill>
-                  <a:schemeClr val="bg1"/>
-                </a:solidFill>
-              </a:rPr>
-              <a:t>MariaDB</a:t>
-            </a:r>
-            <a:endParaRPr lang="ko-KR" altLang="en-US" dirty="0">
-              <a:solidFill>
-                <a:schemeClr val="bg1"/>
-              </a:solidFill>
-            </a:endParaRPr>
-          </a:p>
-        </p:txBody>
-      </p:sp>
-      <p:sp>
-        <p:nvSpPr>
-          <p:cNvPr id="7" name="내용 개체 틀 2"/>
-          <p:cNvSpPr txBox="1">
-            <a:spLocks/>
-          </p:cNvSpPr>
-          <p:nvPr/>
-        </p:nvSpPr>
-        <p:spPr>
-          <a:xfrm>
-            <a:off x="457200" y="1334192"/>
-            <a:ext cx="11222182" cy="4525963"/>
-          </a:xfrm>
-          <a:prstGeom prst="rect">
-            <a:avLst/>
-          </a:prstGeom>
-        </p:spPr>
-        <p:txBody>
-          <a:bodyPr/>
-          <a:lstStyle>
-            <a:lvl1pPr marL="228600" indent="-228600" algn="l" defTabSz="914400" rtl="0" eaLnBrk="1" latinLnBrk="1" hangingPunct="1">
-              <a:lnSpc>
-                <a:spcPct val="90000"/>
-              </a:lnSpc>
-              <a:spcBef>
-                <a:spcPts val="1000"/>
-              </a:spcBef>
-              <a:buFont typeface="Arial" panose="020B0604020202020204" pitchFamily="34" charset="0"/>
-              <a:buChar char="•"/>
-              <a:defRPr sz="2800" kern="1200">
-                <a:solidFill>
-                  <a:schemeClr val="tx1"/>
-                </a:solidFill>
-                <a:latin typeface="+mn-lt"/>
-                <a:ea typeface="+mn-ea"/>
-                <a:cs typeface="+mn-cs"/>
-              </a:defRPr>
-            </a:lvl1pPr>
-            <a:lvl2pPr marL="685800" indent="-228600" algn="l" defTabSz="914400" rtl="0" eaLnBrk="1" latinLnBrk="1" hangingPunct="1">
-              <a:lnSpc>
-                <a:spcPct val="90000"/>
-              </a:lnSpc>
-              <a:spcBef>
-                <a:spcPts val="500"/>
-              </a:spcBef>
-              <a:buFont typeface="Arial" panose="020B0604020202020204" pitchFamily="34" charset="0"/>
-              <a:buChar char="•"/>
-              <a:defRPr sz="2400" kern="1200">
-                <a:solidFill>
-                  <a:schemeClr val="tx1"/>
-                </a:solidFill>
-                <a:latin typeface="+mn-lt"/>
-                <a:ea typeface="+mn-ea"/>
-                <a:cs typeface="+mn-cs"/>
-              </a:defRPr>
-            </a:lvl2pPr>
-            <a:lvl3pPr marL="1143000" indent="-228600" algn="l" defTabSz="914400" rtl="0" eaLnBrk="1" latinLnBrk="1" hangingPunct="1">
-              <a:lnSpc>
-                <a:spcPct val="90000"/>
-              </a:lnSpc>
-              <a:spcBef>
-                <a:spcPts val="500"/>
-              </a:spcBef>
-              <a:buFont typeface="Arial" panose="020B0604020202020204" pitchFamily="34" charset="0"/>
-              <a:buChar char="•"/>
-              <a:defRPr sz="2000" kern="1200">
-                <a:solidFill>
-                  <a:schemeClr val="tx1"/>
-                </a:solidFill>
-                <a:latin typeface="+mn-lt"/>
-                <a:ea typeface="+mn-ea"/>
-                <a:cs typeface="+mn-cs"/>
-              </a:defRPr>
-            </a:lvl3pPr>
-            <a:lvl4pPr marL="1600200" indent="-228600" algn="l" defTabSz="914400" rtl="0" eaLnBrk="1" latinLnBrk="1" hangingPunct="1">
-              <a:lnSpc>
-                <a:spcPct val="90000"/>
-              </a:lnSpc>
-              <a:spcBef>
-                <a:spcPts val="500"/>
-              </a:spcBef>
-              <a:buFont typeface="Arial" panose="020B0604020202020204" pitchFamily="34" charset="0"/>
-              <a:buChar char="•"/>
-              <a:defRPr sz="1800" kern="1200">
-                <a:solidFill>
-                  <a:schemeClr val="tx1"/>
-                </a:solidFill>
-                <a:latin typeface="+mn-lt"/>
-                <a:ea typeface="+mn-ea"/>
-                <a:cs typeface="+mn-cs"/>
-              </a:defRPr>
-            </a:lvl4pPr>
-            <a:lvl5pPr marL="2057400" indent="-228600" algn="l" defTabSz="914400" rtl="0" eaLnBrk="1" latinLnBrk="1" hangingPunct="1">
-              <a:lnSpc>
-                <a:spcPct val="90000"/>
-              </a:lnSpc>
-              <a:spcBef>
-                <a:spcPts val="500"/>
-              </a:spcBef>
-              <a:buFont typeface="Arial" panose="020B0604020202020204" pitchFamily="34" charset="0"/>
-              <a:buChar char="•"/>
-              <a:defRPr sz="1800" kern="1200">
-                <a:solidFill>
-                  <a:schemeClr val="tx1"/>
-                </a:solidFill>
-                <a:latin typeface="+mn-lt"/>
-                <a:ea typeface="+mn-ea"/>
-                <a:cs typeface="+mn-cs"/>
-              </a:defRPr>
-            </a:lvl5pPr>
-            <a:lvl6pPr marL="2514600" indent="-228600" algn="l" defTabSz="914400" rtl="0" eaLnBrk="1" latinLnBrk="1" hangingPunct="1">
-              <a:lnSpc>
-                <a:spcPct val="90000"/>
-              </a:lnSpc>
-              <a:spcBef>
-                <a:spcPts val="500"/>
-              </a:spcBef>
-              <a:buFont typeface="Arial" panose="020B0604020202020204" pitchFamily="34" charset="0"/>
-              <a:buChar char="•"/>
-              <a:defRPr sz="1800" kern="1200">
-                <a:solidFill>
-                  <a:schemeClr val="tx1"/>
-                </a:solidFill>
-                <a:latin typeface="+mn-lt"/>
-                <a:ea typeface="+mn-ea"/>
-                <a:cs typeface="+mn-cs"/>
-              </a:defRPr>
-            </a:lvl6pPr>
-            <a:lvl7pPr marL="2971800" indent="-228600" algn="l" defTabSz="914400" rtl="0" eaLnBrk="1" latinLnBrk="1" hangingPunct="1">
-              <a:lnSpc>
-                <a:spcPct val="90000"/>
-              </a:lnSpc>
-              <a:spcBef>
-                <a:spcPts val="500"/>
-              </a:spcBef>
-              <a:buFont typeface="Arial" panose="020B0604020202020204" pitchFamily="34" charset="0"/>
-              <a:buChar char="•"/>
-              <a:defRPr sz="1800" kern="1200">
-                <a:solidFill>
-                  <a:schemeClr val="tx1"/>
-                </a:solidFill>
-                <a:latin typeface="+mn-lt"/>
-                <a:ea typeface="+mn-ea"/>
-                <a:cs typeface="+mn-cs"/>
-              </a:defRPr>
-            </a:lvl7pPr>
-            <a:lvl8pPr marL="3429000" indent="-228600" algn="l" defTabSz="914400" rtl="0" eaLnBrk="1" latinLnBrk="1" hangingPunct="1">
-              <a:lnSpc>
-                <a:spcPct val="90000"/>
-              </a:lnSpc>
-              <a:spcBef>
-                <a:spcPts val="500"/>
-              </a:spcBef>
-              <a:buFont typeface="Arial" panose="020B0604020202020204" pitchFamily="34" charset="0"/>
-              <a:buChar char="•"/>
-              <a:defRPr sz="1800" kern="1200">
-                <a:solidFill>
-                  <a:schemeClr val="tx1"/>
-                </a:solidFill>
-                <a:latin typeface="+mn-lt"/>
-                <a:ea typeface="+mn-ea"/>
-                <a:cs typeface="+mn-cs"/>
-              </a:defRPr>
-            </a:lvl8pPr>
-            <a:lvl9pPr marL="3886200" indent="-228600" algn="l" defTabSz="914400" rtl="0" eaLnBrk="1" latinLnBrk="1" hangingPunct="1">
-              <a:lnSpc>
-                <a:spcPct val="90000"/>
-              </a:lnSpc>
-              <a:spcBef>
-                <a:spcPts val="500"/>
-              </a:spcBef>
-              <a:buFont typeface="Arial" panose="020B0604020202020204" pitchFamily="34" charset="0"/>
-              <a:buChar char="•"/>
-              <a:defRPr sz="1800" kern="1200">
-                <a:solidFill>
-                  <a:schemeClr val="tx1"/>
-                </a:solidFill>
-                <a:latin typeface="+mn-lt"/>
-                <a:ea typeface="+mn-ea"/>
-                <a:cs typeface="+mn-cs"/>
-              </a:defRPr>
-            </a:lvl9pPr>
-          </a:lstStyle>
-          <a:p>
-            <a:pPr marL="0" indent="0">
-              <a:lnSpc>
-                <a:spcPct val="150000"/>
-              </a:lnSpc>
-              <a:buNone/>
-            </a:pPr>
-            <a:r>
-              <a:rPr lang="en-US" altLang="ko-KR" dirty="0" err="1" smtClean="0"/>
-              <a:t>HeidiSQL</a:t>
-            </a:r>
-            <a:r>
-              <a:rPr lang="en-US" altLang="ko-KR" dirty="0" smtClean="0"/>
-              <a:t> </a:t>
-            </a:r>
-            <a:r>
-              <a:rPr lang="ko-KR" altLang="en-US" dirty="0" smtClean="0"/>
-              <a:t>접속</a:t>
-            </a:r>
-            <a:endParaRPr lang="en-US" altLang="ko-KR" dirty="0" smtClean="0"/>
-          </a:p>
-        </p:txBody>
-      </p:sp>
-      <p:pic>
-        <p:nvPicPr>
-          <p:cNvPr id="2" name="그림 1"/>
-          <p:cNvPicPr>
-            <a:picLocks noChangeAspect="1"/>
-          </p:cNvPicPr>
-          <p:nvPr/>
-        </p:nvPicPr>
-        <p:blipFill>
-          <a:blip r:embed="rId2"/>
-          <a:stretch>
-            <a:fillRect/>
-          </a:stretch>
-        </p:blipFill>
-        <p:spPr>
-          <a:xfrm>
-            <a:off x="765868" y="2580361"/>
-            <a:ext cx="4297341" cy="3069529"/>
-          </a:xfrm>
-          <a:prstGeom prst="rect">
-            <a:avLst/>
-          </a:prstGeom>
-        </p:spPr>
-      </p:pic>
-      <p:sp>
-        <p:nvSpPr>
-          <p:cNvPr id="8" name="직사각형 7"/>
-          <p:cNvSpPr/>
-          <p:nvPr/>
-        </p:nvSpPr>
-        <p:spPr>
-          <a:xfrm>
-            <a:off x="753342" y="5373665"/>
-            <a:ext cx="561891" cy="315543"/>
-          </a:xfrm>
-          <a:prstGeom prst="rect">
-            <a:avLst/>
-          </a:prstGeom>
-          <a:noFill/>
-          <a:ln w="28575">
-            <a:solidFill>
-              <a:srgbClr val="FF0000"/>
-            </a:solidFill>
-          </a:ln>
-        </p:spPr>
-        <p:style>
-          <a:lnRef idx="2">
-            <a:schemeClr val="accent1">
-              <a:shade val="50000"/>
-            </a:schemeClr>
-          </a:lnRef>
-          <a:fillRef idx="1">
-            <a:schemeClr val="accent1"/>
-          </a:fillRef>
-          <a:effectRef idx="0">
-            <a:schemeClr val="accent1"/>
-          </a:effectRef>
-          <a:fontRef idx="minor">
-            <a:schemeClr val="lt1"/>
-          </a:fontRef>
-        </p:style>
-        <p:txBody>
-          <a:bodyPr rtlCol="0" anchor="ctr"/>
-          <a:lstStyle/>
-          <a:p>
-            <a:pPr algn="ctr"/>
-            <a:endParaRPr lang="ko-KR" altLang="en-US"/>
-          </a:p>
-        </p:txBody>
-      </p:sp>
-      <p:sp>
-        <p:nvSpPr>
-          <p:cNvPr id="9" name="직사각형 8"/>
-          <p:cNvSpPr/>
-          <p:nvPr/>
-        </p:nvSpPr>
-        <p:spPr>
-          <a:xfrm>
-            <a:off x="3310739" y="3321295"/>
-            <a:ext cx="1875036" cy="1050289"/>
-          </a:xfrm>
-          <a:prstGeom prst="rect">
-            <a:avLst/>
-          </a:prstGeom>
-          <a:noFill/>
-          <a:ln w="28575">
-            <a:solidFill>
-              <a:srgbClr val="FF0000"/>
-            </a:solidFill>
-          </a:ln>
-        </p:spPr>
-        <p:style>
-          <a:lnRef idx="2">
-            <a:schemeClr val="accent1">
-              <a:shade val="50000"/>
-            </a:schemeClr>
-          </a:lnRef>
-          <a:fillRef idx="1">
-            <a:schemeClr val="accent1"/>
-          </a:fillRef>
-          <a:effectRef idx="0">
-            <a:schemeClr val="accent1"/>
-          </a:effectRef>
-          <a:fontRef idx="minor">
-            <a:schemeClr val="lt1"/>
-          </a:fontRef>
-        </p:style>
-        <p:txBody>
-          <a:bodyPr rtlCol="0" anchor="ctr"/>
-          <a:lstStyle/>
-          <a:p>
-            <a:pPr algn="ctr"/>
-            <a:endParaRPr lang="ko-KR" altLang="en-US"/>
-          </a:p>
-        </p:txBody>
-      </p:sp>
-      <p:pic>
-        <p:nvPicPr>
-          <p:cNvPr id="3" name="그림 2"/>
-          <p:cNvPicPr>
-            <a:picLocks noChangeAspect="1"/>
-          </p:cNvPicPr>
-          <p:nvPr/>
-        </p:nvPicPr>
-        <p:blipFill>
-          <a:blip r:embed="rId3"/>
-          <a:stretch>
-            <a:fillRect/>
-          </a:stretch>
-        </p:blipFill>
-        <p:spPr>
-          <a:xfrm>
-            <a:off x="5638497" y="2008582"/>
-            <a:ext cx="5788578" cy="3680626"/>
-          </a:xfrm>
-          <a:prstGeom prst="rect">
-            <a:avLst/>
-          </a:prstGeom>
-        </p:spPr>
-      </p:pic>
-    </p:spTree>
-    <p:extLst>
-      <p:ext uri="{BB962C8B-B14F-4D97-AF65-F5344CB8AC3E}">
-        <p14:creationId xmlns:p14="http://schemas.microsoft.com/office/powerpoint/2010/main" val="1113111086"/>
-      </p:ext>
-    </p:extLst>
-  </p:cSld>
-  <p:clrMapOvr>
-    <a:masterClrMapping/>
-  </p:clrMapOvr>
-</p:sld>
-</file>
-
 <file path=ppt/slides/slide2.xml><?xml version="1.0" encoding="utf-8"?>
 <p:sld xmlns:a="http://schemas.openxmlformats.org/drawingml/2006/main" xmlns:r="http://schemas.openxmlformats.org/officeDocument/2006/relationships" xmlns:p="http://schemas.openxmlformats.org/presentationml/2006/main">
   <p:cSld>
@@ -10572,24 +8812,6 @@
             </a:lvl9pPr>
           </a:lstStyle>
           <a:p>
-            <a:pPr>
-              <a:lnSpc>
-                <a:spcPct val="150000"/>
-              </a:lnSpc>
-              <a:buFontTx/>
-              <a:buChar char="-"/>
-            </a:pPr>
-            <a:r>
-              <a:rPr lang="en-US" altLang="ko-KR" dirty="0" smtClean="0"/>
-              <a:t>MySQL </a:t>
-            </a:r>
-            <a:r>
-              <a:rPr lang="ko-KR" altLang="en-US" dirty="0" smtClean="0"/>
-              <a:t>삭제</a:t>
-            </a:r>
-            <a:endParaRPr lang="en-US" altLang="ko-KR" dirty="0" smtClean="0"/>
-          </a:p>
-          <a:p>
             <a:pPr marL="0" indent="0">
               <a:lnSpc>
                 <a:spcPct val="150000"/>
@@ -10597,49 +8819,128 @@
               <a:buNone/>
             </a:pPr>
             <a:r>
+              <a:rPr lang="ko-KR" altLang="en-US" dirty="0" smtClean="0"/>
+              <a:t>다운로드 및 설치</a:t>
+            </a:r>
+            <a:endParaRPr lang="en-US" altLang="ko-KR" dirty="0" smtClean="0"/>
+          </a:p>
+          <a:p>
+            <a:pPr marL="0" indent="0">
+              <a:lnSpc>
+                <a:spcPct val="150000"/>
+              </a:lnSpc>
+              <a:buNone/>
+            </a:pPr>
+            <a:r>
+              <a:rPr lang="ko-KR" altLang="en-US" dirty="0" smtClean="0"/>
+              <a:t>  </a:t>
+            </a:r>
+            <a:r>
+              <a:rPr lang="en-US" altLang="ko-KR" dirty="0"/>
+              <a:t>- </a:t>
+            </a:r>
+            <a:r>
+              <a:rPr lang="ko-KR" altLang="en-US" dirty="0" smtClean="0"/>
+              <a:t>다운로드링크</a:t>
+            </a:r>
+            <a:endParaRPr lang="en-US" altLang="ko-KR" dirty="0" smtClean="0"/>
+          </a:p>
+          <a:p>
+            <a:pPr marL="0" indent="0">
+              <a:lnSpc>
+                <a:spcPct val="150000"/>
+              </a:lnSpc>
+              <a:buNone/>
+            </a:pPr>
+            <a:r>
+              <a:rPr lang="en-US" altLang="ko-KR" dirty="0" smtClean="0">
+                <a:hlinkClick r:id="rId2"/>
+              </a:rPr>
+              <a:t>https</a:t>
+            </a:r>
+            <a:r>
+              <a:rPr lang="en-US" altLang="ko-KR" dirty="0">
+                <a:hlinkClick r:id="rId2"/>
+              </a:rPr>
+              <a:t>://mariadb.org/download/?</a:t>
+            </a:r>
+            <a:r>
+              <a:rPr lang="en-US" altLang="ko-KR" dirty="0" smtClean="0">
+                <a:hlinkClick r:id="rId2"/>
+              </a:rPr>
+              <a:t>t=mariadb&amp;p=mariadb&amp;r=10.6.8&amp;os=windows&amp;cpu=x86_64&amp;pkg=msi&amp;m=yongbok</a:t>
+            </a:r>
+            <a:endParaRPr lang="en-US" altLang="ko-KR" dirty="0" smtClean="0"/>
+          </a:p>
+          <a:p>
+            <a:pPr marL="0" indent="0">
+              <a:lnSpc>
+                <a:spcPct val="150000"/>
+              </a:lnSpc>
+              <a:buNone/>
+            </a:pPr>
+            <a:r>
               <a:rPr lang="en-US" altLang="ko-KR" dirty="0"/>
               <a:t> </a:t>
             </a:r>
             <a:r>
               <a:rPr lang="en-US" altLang="ko-KR" dirty="0" smtClean="0"/>
-              <a:t> MySQL Installer </a:t>
+              <a:t> - </a:t>
+            </a:r>
+            <a:r>
+              <a:rPr lang="en-US" altLang="ko-KR" dirty="0" err="1" smtClean="0"/>
+              <a:t>mariaDB</a:t>
+            </a:r>
+            <a:r>
+              <a:rPr lang="en-US" altLang="ko-KR" dirty="0" smtClean="0"/>
+              <a:t> </a:t>
             </a:r>
             <a:r>
               <a:rPr lang="ko-KR" altLang="en-US" dirty="0" smtClean="0"/>
-              <a:t>실행</a:t>
-            </a:r>
-            <a:endParaRPr lang="en-US" altLang="ko-KR" dirty="0" smtClean="0"/>
-          </a:p>
-        </p:txBody>
-      </p:sp>
-      <p:pic>
-        <p:nvPicPr>
-          <p:cNvPr id="2" name="그림 1"/>
-          <p:cNvPicPr>
-            <a:picLocks noChangeAspect="1"/>
-          </p:cNvPicPr>
-          <p:nvPr/>
-        </p:nvPicPr>
-        <p:blipFill>
-          <a:blip r:embed="rId2"/>
-          <a:stretch>
-            <a:fillRect/>
-          </a:stretch>
-        </p:blipFill>
-        <p:spPr>
-          <a:xfrm>
-            <a:off x="5423771" y="1567043"/>
-            <a:ext cx="6257424" cy="5143200"/>
-          </a:xfrm>
-          <a:prstGeom prst="rect">
-            <a:avLst/>
-          </a:prstGeom>
-        </p:spPr>
-      </p:pic>
+              <a:t>홈페이지</a:t>
+            </a:r>
+            <a:r>
+              <a:rPr lang="en-US" altLang="ko-KR" dirty="0" smtClean="0"/>
+              <a:t>(</a:t>
+            </a:r>
+            <a:r>
+              <a:rPr lang="en-US" altLang="ko-KR" dirty="0" smtClean="0">
+                <a:hlinkClick r:id="rId3"/>
+              </a:rPr>
+              <a:t>https://mariadb.org</a:t>
+            </a:r>
+            <a:r>
+              <a:rPr lang="en-US" altLang="ko-KR" dirty="0" smtClean="0"/>
+              <a:t>) </a:t>
+            </a:r>
+          </a:p>
+          <a:p>
+            <a:pPr marL="0" indent="0">
+              <a:lnSpc>
+                <a:spcPct val="150000"/>
+              </a:lnSpc>
+              <a:buNone/>
+            </a:pPr>
+            <a:r>
+              <a:rPr lang="en-US" altLang="ko-KR" dirty="0"/>
+              <a:t> </a:t>
+            </a:r>
+            <a:r>
+              <a:rPr lang="en-US" altLang="ko-KR" dirty="0" smtClean="0"/>
+              <a:t>    =&gt; download </a:t>
+            </a:r>
+            <a:r>
+              <a:rPr lang="ko-KR" altLang="en-US" dirty="0" smtClean="0"/>
+              <a:t>페이지 접속</a:t>
+            </a:r>
+            <a:endParaRPr lang="en-US" altLang="ko-KR" dirty="0"/>
+          </a:p>
+        </p:txBody>
+      </p:sp>
     </p:spTree>
     <p:extLst>
       <p:ext uri="{BB962C8B-B14F-4D97-AF65-F5344CB8AC3E}">
-        <p14:creationId xmlns:p14="http://schemas.microsoft.com/office/powerpoint/2010/main" val="1278352682"/>
+        <p14:creationId xmlns:p14="http://schemas.microsoft.com/office/powerpoint/2010/main" val="508658935"/>
       </p:ext>
     </p:extLst>
   </p:cSld>
@@ -10900,24 +9201,6 @@
             </a:lvl9pPr>
           </a:lstStyle>
           <a:p>
-            <a:pPr>
-              <a:lnSpc>
-                <a:spcPct val="150000"/>
-              </a:lnSpc>
-              <a:buFontTx/>
-              <a:buChar char="-"/>
-            </a:pPr>
-            <a:r>
-              <a:rPr lang="en-US" altLang="ko-KR" dirty="0" smtClean="0"/>
-              <a:t>MySQL </a:t>
-            </a:r>
-            <a:r>
-              <a:rPr lang="ko-KR" altLang="en-US" dirty="0" smtClean="0"/>
-              <a:t>삭제</a:t>
-            </a:r>
-            <a:endParaRPr lang="en-US" altLang="ko-KR" dirty="0" smtClean="0"/>
-          </a:p>
-          <a:p>
             <a:pPr marL="0" indent="0">
               <a:lnSpc>
                 <a:spcPct val="150000"/>
@@ -10925,16 +9208,8 @@
               <a:buNone/>
             </a:pPr>
             <a:r>
-              <a:rPr lang="en-US" altLang="ko-KR" dirty="0"/>
-              <a:t> </a:t>
-            </a:r>
-            <a:r>
-              <a:rPr lang="en-US" altLang="ko-KR" dirty="0" smtClean="0"/>
-              <a:t> Remove </a:t>
-            </a:r>
-            <a:r>
               <a:rPr lang="ko-KR" altLang="en-US" dirty="0" smtClean="0"/>
-              <a:t>실행</a:t>
+              <a:t>다운로드 및 설치</a:t>
             </a:r>
             <a:endParaRPr lang="en-US" altLang="ko-KR" dirty="0" smtClean="0"/>
           </a:p>
@@ -10942,7 +9217,7 @@
       </p:sp>
       <p:pic>
         <p:nvPicPr>
-          <p:cNvPr id="3" name="그림 2"/>
+          <p:cNvPr id="2" name="그림 1"/>
           <p:cNvPicPr>
             <a:picLocks noChangeAspect="1"/>
           </p:cNvPicPr>
@@ -10956,8 +9231,8 @@
         </p:blipFill>
         <p:spPr>
           <a:xfrm>
-            <a:off x="4344313" y="917988"/>
-            <a:ext cx="7486650" cy="5648325"/>
+            <a:off x="1105943" y="2053809"/>
+            <a:ext cx="9102770" cy="4551384"/>
           </a:xfrm>
           <a:prstGeom prst="rect">
             <a:avLst/>
@@ -10966,14 +9241,14 @@
       </p:pic>
       <p:sp>
         <p:nvSpPr>
-          <p:cNvPr id="6" name="직사각형 5"/>
+          <p:cNvPr id="3" name="직사각형 2"/>
           <p:cNvSpPr/>
           <p:nvPr/>
         </p:nvSpPr>
         <p:spPr>
           <a:xfrm>
-            <a:off x="10478152" y="3221392"/>
-            <a:ext cx="1352811" cy="461260"/>
+            <a:off x="4208745" y="6012493"/>
+            <a:ext cx="1352811" cy="751562"/>
           </a:xfrm>
           <a:prstGeom prst="rect">
             <a:avLst/>
@@ -11013,7 +9288,7 @@
     </p:spTree>
     <p:extLst>
       <p:ext uri="{BB962C8B-B14F-4D97-AF65-F5344CB8AC3E}">
-        <p14:creationId xmlns:p14="http://schemas.microsoft.com/office/powerpoint/2010/main" val="1158349057"/>
+        <p14:creationId xmlns:p14="http://schemas.microsoft.com/office/powerpoint/2010/main" val="1607997491"/>
       </p:ext>
     </p:extLst>
   </p:cSld>
@@ -11274,24 +9549,6 @@
             </a:lvl9pPr>
           </a:lstStyle>
           <a:p>
-            <a:pPr>
-              <a:lnSpc>
-                <a:spcPct val="150000"/>
-              </a:lnSpc>
-              <a:buFontTx/>
-              <a:buChar char="-"/>
-            </a:pPr>
-            <a:r>
-              <a:rPr lang="en-US" altLang="ko-KR" dirty="0" smtClean="0"/>
-              <a:t>MySQL </a:t>
-            </a:r>
-            <a:r>
-              <a:rPr lang="ko-KR" altLang="en-US" dirty="0" smtClean="0"/>
-              <a:t>삭제</a:t>
-            </a:r>
-            <a:endParaRPr lang="en-US" altLang="ko-KR" dirty="0" smtClean="0"/>
-          </a:p>
-          <a:p>
             <a:pPr marL="0" indent="0">
               <a:lnSpc>
                 <a:spcPct val="150000"/>
@@ -11299,16 +9556,8 @@
               <a:buNone/>
             </a:pPr>
             <a:r>
-              <a:rPr lang="en-US" altLang="ko-KR" dirty="0"/>
-              <a:t> </a:t>
-            </a:r>
-            <a:r>
-              <a:rPr lang="en-US" altLang="ko-KR" dirty="0" smtClean="0"/>
-              <a:t> Remove </a:t>
-            </a:r>
-            <a:r>
               <a:rPr lang="ko-KR" altLang="en-US" dirty="0" smtClean="0"/>
-              <a:t>실행</a:t>
+              <a:t>다운로드 및 설치</a:t>
             </a:r>
             <a:endParaRPr lang="en-US" altLang="ko-KR" dirty="0" smtClean="0"/>
           </a:p>
@@ -11316,7 +9565,7 @@
       </p:sp>
       <p:pic>
         <p:nvPicPr>
-          <p:cNvPr id="2" name="그림 1"/>
+          <p:cNvPr id="4" name="그림 3"/>
           <p:cNvPicPr>
             <a:picLocks noChangeAspect="1"/>
           </p:cNvPicPr>
@@ -11330,8 +9579,8 @@
         </p:blipFill>
         <p:spPr>
           <a:xfrm>
-            <a:off x="4222922" y="773010"/>
-            <a:ext cx="7486650" cy="5648325"/>
+            <a:off x="457200" y="2173980"/>
+            <a:ext cx="4714875" cy="3686175"/>
           </a:xfrm>
           <a:prstGeom prst="rect">
             <a:avLst/>
@@ -11346,8 +9595,8 @@
         </p:nvSpPr>
         <p:spPr>
           <a:xfrm>
-            <a:off x="6613436" y="2169206"/>
-            <a:ext cx="4747671" cy="461260"/>
+            <a:off x="3362912" y="5408205"/>
+            <a:ext cx="914400" cy="451950"/>
           </a:xfrm>
           <a:prstGeom prst="rect">
             <a:avLst/>
@@ -11384,6 +9633,30 @@
           </a:p>
         </p:txBody>
       </p:sp>
+      <p:pic>
+        <p:nvPicPr>
+          <p:cNvPr id="5" name="그림 4"/>
+          <p:cNvPicPr>
+            <a:picLocks noChangeAspect="1"/>
+          </p:cNvPicPr>
+          <p:nvPr/>
+        </p:nvPicPr>
+        <p:blipFill>
+          <a:blip r:embed="rId3"/>
+          <a:stretch>
+            <a:fillRect/>
+          </a:stretch>
+        </p:blipFill>
+        <p:spPr>
+          <a:xfrm>
+            <a:off x="3500568" y="1585912"/>
+            <a:ext cx="4714875" cy="3686175"/>
+          </a:xfrm>
+          <a:prstGeom prst="rect">
+            <a:avLst/>
+          </a:prstGeom>
+        </p:spPr>
+      </p:pic>
       <p:sp>
         <p:nvSpPr>
           <p:cNvPr id="9" name="직사각형 8"/>
@@ -11392,8 +9665,8 @@
         </p:nvSpPr>
         <p:spPr>
           <a:xfrm>
-            <a:off x="9745249" y="5964366"/>
-            <a:ext cx="1070713" cy="461260"/>
+            <a:off x="6396740" y="4795147"/>
+            <a:ext cx="914400" cy="451950"/>
           </a:xfrm>
           <a:prstGeom prst="rect">
             <a:avLst/>
@@ -11433,7 +9706,7 @@
     </p:spTree>
     <p:extLst>
       <p:ext uri="{BB962C8B-B14F-4D97-AF65-F5344CB8AC3E}">
-        <p14:creationId xmlns:p14="http://schemas.microsoft.com/office/powerpoint/2010/main" val="3875584626"/>
+        <p14:creationId xmlns:p14="http://schemas.microsoft.com/office/powerpoint/2010/main" val="3995086111"/>
       </p:ext>
     </p:extLst>
   </p:cSld>
@@ -11694,24 +9967,6 @@
             </a:lvl9pPr>
           </a:lstStyle>
           <a:p>
-            <a:pPr>
-              <a:lnSpc>
-                <a:spcPct val="150000"/>
-              </a:lnSpc>
-              <a:buFontTx/>
-              <a:buChar char="-"/>
-            </a:pPr>
-            <a:r>
-              <a:rPr lang="en-US" altLang="ko-KR" dirty="0" smtClean="0"/>
-              <a:t>MySQL </a:t>
-            </a:r>
-            <a:r>
-              <a:rPr lang="ko-KR" altLang="en-US" dirty="0" smtClean="0"/>
-              <a:t>삭제</a:t>
-            </a:r>
-            <a:endParaRPr lang="en-US" altLang="ko-KR" dirty="0" smtClean="0"/>
-          </a:p>
-          <a:p>
             <a:pPr marL="0" indent="0">
               <a:lnSpc>
                 <a:spcPct val="150000"/>
@@ -11719,16 +9974,8 @@
               <a:buNone/>
             </a:pPr>
             <a:r>
-              <a:rPr lang="en-US" altLang="ko-KR" dirty="0"/>
-              <a:t> </a:t>
-            </a:r>
-            <a:r>
-              <a:rPr lang="en-US" altLang="ko-KR" dirty="0" smtClean="0"/>
-              <a:t> Remove </a:t>
-            </a:r>
-            <a:r>
               <a:rPr lang="ko-KR" altLang="en-US" dirty="0" smtClean="0"/>
-              <a:t>실행</a:t>
+              <a:t>다운로드 및 설치</a:t>
             </a:r>
             <a:endParaRPr lang="en-US" altLang="ko-KR" dirty="0" smtClean="0"/>
           </a:p>
@@ -11736,7 +9983,7 @@
       </p:sp>
       <p:pic>
         <p:nvPicPr>
-          <p:cNvPr id="3" name="그림 2"/>
+          <p:cNvPr id="2" name="그림 1"/>
           <p:cNvPicPr>
             <a:picLocks noChangeAspect="1"/>
           </p:cNvPicPr>
@@ -11750,8 +9997,8 @@
         </p:blipFill>
         <p:spPr>
           <a:xfrm>
-            <a:off x="4482100" y="968092"/>
-            <a:ext cx="7486650" cy="5648325"/>
+            <a:off x="765868" y="2500312"/>
+            <a:ext cx="4714875" cy="3686175"/>
           </a:xfrm>
           <a:prstGeom prst="rect">
             <a:avLst/>
@@ -11766,8 +10013,8 @@
         </p:nvSpPr>
         <p:spPr>
           <a:xfrm>
-            <a:off x="10045874" y="6155157"/>
-            <a:ext cx="1070713" cy="461260"/>
+            <a:off x="3803853" y="5682111"/>
+            <a:ext cx="914400" cy="451950"/>
           </a:xfrm>
           <a:prstGeom prst="rect">
             <a:avLst/>
@@ -11804,10 +10051,383 @@
           </a:p>
         </p:txBody>
       </p:sp>
+      <p:pic>
+        <p:nvPicPr>
+          <p:cNvPr id="3" name="그림 2"/>
+          <p:cNvPicPr>
+            <a:picLocks noChangeAspect="1"/>
+          </p:cNvPicPr>
+          <p:nvPr/>
+        </p:nvPicPr>
+        <p:blipFill>
+          <a:blip r:embed="rId3"/>
+          <a:stretch>
+            <a:fillRect/>
+          </a:stretch>
+        </p:blipFill>
+        <p:spPr>
+          <a:xfrm>
+            <a:off x="4452545" y="1754085"/>
+            <a:ext cx="4714875" cy="3686175"/>
+          </a:xfrm>
+          <a:prstGeom prst="rect">
+            <a:avLst/>
+          </a:prstGeom>
+        </p:spPr>
+      </p:pic>
+      <p:sp>
+        <p:nvSpPr>
+          <p:cNvPr id="11" name="직사각형 10"/>
+          <p:cNvSpPr/>
+          <p:nvPr/>
+        </p:nvSpPr>
+        <p:spPr>
+          <a:xfrm>
+            <a:off x="5673151" y="2906038"/>
+            <a:ext cx="1366475" cy="751561"/>
+          </a:xfrm>
+          <a:prstGeom prst="rect">
+            <a:avLst/>
+          </a:prstGeom>
+          <a:noFill/>
+          <a:ln w="28575">
+            <a:solidFill>
+              <a:srgbClr val="FF0000"/>
+            </a:solidFill>
+          </a:ln>
+        </p:spPr>
+        <p:style>
+          <a:lnRef idx="2">
+            <a:schemeClr val="accent1">
+              <a:shade val="50000"/>
+            </a:schemeClr>
+          </a:lnRef>
+          <a:fillRef idx="1">
+            <a:schemeClr val="accent1"/>
+          </a:fillRef>
+          <a:effectRef idx="0">
+            <a:schemeClr val="accent1"/>
+          </a:effectRef>
+          <a:fontRef idx="minor">
+            <a:schemeClr val="lt1"/>
+          </a:fontRef>
+        </p:style>
+        <p:txBody>
+          <a:bodyPr rtlCol="0" anchor="ctr"/>
+          <a:lstStyle/>
+          <a:p>
+            <a:pPr algn="ctr"/>
+            <a:endParaRPr lang="ko-KR" altLang="en-US"/>
+          </a:p>
+        </p:txBody>
+      </p:sp>
+      <p:sp>
+        <p:nvSpPr>
+          <p:cNvPr id="12" name="직사각형 11"/>
+          <p:cNvSpPr/>
+          <p:nvPr/>
+        </p:nvSpPr>
+        <p:spPr>
+          <a:xfrm>
+            <a:off x="7350807" y="4982191"/>
+            <a:ext cx="914400" cy="451950"/>
+          </a:xfrm>
+          <a:prstGeom prst="rect">
+            <a:avLst/>
+          </a:prstGeom>
+          <a:noFill/>
+          <a:ln w="28575">
+            <a:solidFill>
+              <a:srgbClr val="FF0000"/>
+            </a:solidFill>
+          </a:ln>
+        </p:spPr>
+        <p:style>
+          <a:lnRef idx="2">
+            <a:schemeClr val="accent1">
+              <a:shade val="50000"/>
+            </a:schemeClr>
+          </a:lnRef>
+          <a:fillRef idx="1">
+            <a:schemeClr val="accent1"/>
+          </a:fillRef>
+          <a:effectRef idx="0">
+            <a:schemeClr val="accent1"/>
+          </a:effectRef>
+          <a:fontRef idx="minor">
+            <a:schemeClr val="lt1"/>
+          </a:fontRef>
+        </p:style>
+        <p:txBody>
+          <a:bodyPr rtlCol="0" anchor="ctr"/>
+          <a:lstStyle/>
+          <a:p>
+            <a:pPr algn="ctr"/>
+            <a:endParaRPr lang="ko-KR" altLang="en-US"/>
+          </a:p>
+        </p:txBody>
+      </p:sp>
+      <p:pic>
+        <p:nvPicPr>
+          <p:cNvPr id="6" name="그림 5"/>
+          <p:cNvPicPr>
+            <a:picLocks noChangeAspect="1"/>
+          </p:cNvPicPr>
+          <p:nvPr/>
+        </p:nvPicPr>
+        <p:blipFill>
+          <a:blip r:embed="rId4"/>
+          <a:stretch>
+            <a:fillRect/>
+          </a:stretch>
+        </p:blipFill>
+        <p:spPr>
+          <a:xfrm>
+            <a:off x="7156915" y="1086069"/>
+            <a:ext cx="4714875" cy="3686175"/>
+          </a:xfrm>
+          <a:prstGeom prst="rect">
+            <a:avLst/>
+          </a:prstGeom>
+        </p:spPr>
+      </p:pic>
+      <p:sp>
+        <p:nvSpPr>
+          <p:cNvPr id="14" name="직사각형 13"/>
+          <p:cNvSpPr/>
+          <p:nvPr/>
+        </p:nvSpPr>
+        <p:spPr>
+          <a:xfrm>
+            <a:off x="10053883" y="4307701"/>
+            <a:ext cx="914400" cy="451950"/>
+          </a:xfrm>
+          <a:prstGeom prst="rect">
+            <a:avLst/>
+          </a:prstGeom>
+          <a:noFill/>
+          <a:ln w="28575">
+            <a:solidFill>
+              <a:srgbClr val="FF0000"/>
+            </a:solidFill>
+          </a:ln>
+        </p:spPr>
+        <p:style>
+          <a:lnRef idx="2">
+            <a:schemeClr val="accent1">
+              <a:shade val="50000"/>
+            </a:schemeClr>
+          </a:lnRef>
+          <a:fillRef idx="1">
+            <a:schemeClr val="accent1"/>
+          </a:fillRef>
+          <a:effectRef idx="0">
+            <a:schemeClr val="accent1"/>
+          </a:effectRef>
+          <a:fontRef idx="minor">
+            <a:schemeClr val="lt1"/>
+          </a:fontRef>
+        </p:style>
+        <p:txBody>
+          <a:bodyPr rtlCol="0" anchor="ctr"/>
+          <a:lstStyle/>
+          <a:p>
+            <a:pPr algn="ctr"/>
+            <a:endParaRPr lang="ko-KR" altLang="en-US"/>
+          </a:p>
+        </p:txBody>
+      </p:sp>
+      <p:pic>
+        <p:nvPicPr>
+          <p:cNvPr id="4" name="그림 3"/>
+          <p:cNvPicPr>
+            <a:picLocks noChangeAspect="1"/>
+          </p:cNvPicPr>
+          <p:nvPr/>
+        </p:nvPicPr>
+        <p:blipFill>
+          <a:blip r:embed="rId5"/>
+          <a:stretch>
+            <a:fillRect/>
+          </a:stretch>
+        </p:blipFill>
+        <p:spPr>
+          <a:xfrm>
+            <a:off x="4546779" y="3995948"/>
+            <a:ext cx="171474" cy="190527"/>
+          </a:xfrm>
+          <a:prstGeom prst="rect">
+            <a:avLst/>
+          </a:prstGeom>
+        </p:spPr>
+      </p:pic>
+      <p:sp>
+        <p:nvSpPr>
+          <p:cNvPr id="13" name="직사각형 12"/>
+          <p:cNvSpPr/>
+          <p:nvPr/>
+        </p:nvSpPr>
+        <p:spPr>
+          <a:xfrm>
+            <a:off x="4459076" y="3931920"/>
+            <a:ext cx="2697839" cy="254555"/>
+          </a:xfrm>
+          <a:prstGeom prst="rect">
+            <a:avLst/>
+          </a:prstGeom>
+          <a:noFill/>
+          <a:ln w="28575">
+            <a:solidFill>
+              <a:srgbClr val="FF0000"/>
+            </a:solidFill>
+          </a:ln>
+        </p:spPr>
+        <p:style>
+          <a:lnRef idx="2">
+            <a:schemeClr val="accent1">
+              <a:shade val="50000"/>
+            </a:schemeClr>
+          </a:lnRef>
+          <a:fillRef idx="1">
+            <a:schemeClr val="accent1"/>
+          </a:fillRef>
+          <a:effectRef idx="0">
+            <a:schemeClr val="accent1"/>
+          </a:effectRef>
+          <a:fontRef idx="minor">
+            <a:schemeClr val="lt1"/>
+          </a:fontRef>
+        </p:style>
+        <p:txBody>
+          <a:bodyPr rtlCol="0" anchor="ctr"/>
+          <a:lstStyle/>
+          <a:p>
+            <a:pPr algn="ctr"/>
+            <a:endParaRPr lang="ko-KR" altLang="en-US"/>
+          </a:p>
+        </p:txBody>
+      </p:sp>
+      <p:sp>
+        <p:nvSpPr>
+          <p:cNvPr id="15" name="직사각형 14"/>
+          <p:cNvSpPr/>
+          <p:nvPr/>
+        </p:nvSpPr>
+        <p:spPr>
+          <a:xfrm>
+            <a:off x="8445428" y="3055843"/>
+            <a:ext cx="432565" cy="302499"/>
+          </a:xfrm>
+          <a:prstGeom prst="rect">
+            <a:avLst/>
+          </a:prstGeom>
+          <a:noFill/>
+          <a:ln w="28575">
+            <a:solidFill>
+              <a:srgbClr val="FF0000"/>
+            </a:solidFill>
+          </a:ln>
+        </p:spPr>
+        <p:style>
+          <a:lnRef idx="2">
+            <a:schemeClr val="accent1">
+              <a:shade val="50000"/>
+            </a:schemeClr>
+          </a:lnRef>
+          <a:fillRef idx="1">
+            <a:schemeClr val="accent1"/>
+          </a:fillRef>
+          <a:effectRef idx="0">
+            <a:schemeClr val="accent1"/>
+          </a:effectRef>
+          <a:fontRef idx="minor">
+            <a:schemeClr val="lt1"/>
+          </a:fontRef>
+        </p:style>
+        <p:txBody>
+          <a:bodyPr rtlCol="0" anchor="ctr"/>
+          <a:lstStyle/>
+          <a:p>
+            <a:pPr algn="ctr"/>
+            <a:endParaRPr lang="ko-KR" altLang="en-US"/>
+          </a:p>
+        </p:txBody>
+      </p:sp>
+      <p:sp>
+        <p:nvSpPr>
+          <p:cNvPr id="5" name="설명선 1(강조선) 4"/>
+          <p:cNvSpPr/>
+          <p:nvPr/>
+        </p:nvSpPr>
+        <p:spPr>
+          <a:xfrm>
+            <a:off x="9724771" y="2586570"/>
+            <a:ext cx="2237642" cy="462272"/>
+          </a:xfrm>
+          <a:prstGeom prst="accentCallout1">
+            <a:avLst/>
+          </a:prstGeom>
+          <a:solidFill>
+            <a:schemeClr val="accent4">
+              <a:lumMod val="20000"/>
+              <a:lumOff val="80000"/>
+            </a:schemeClr>
+          </a:solidFill>
+          <a:ln>
+            <a:solidFill>
+              <a:srgbClr val="FF0000"/>
+            </a:solidFill>
+          </a:ln>
+        </p:spPr>
+        <p:style>
+          <a:lnRef idx="2">
+            <a:schemeClr val="accent1">
+              <a:shade val="50000"/>
+            </a:schemeClr>
+          </a:lnRef>
+          <a:fillRef idx="1">
+            <a:schemeClr val="accent1"/>
+          </a:fillRef>
+          <a:effectRef idx="0">
+            <a:schemeClr val="accent1"/>
+          </a:effectRef>
+          <a:fontRef idx="minor">
+            <a:schemeClr val="lt1"/>
+          </a:fontRef>
+        </p:style>
+        <p:txBody>
+          <a:bodyPr rtlCol="0" anchor="ctr"/>
+          <a:lstStyle/>
+          <a:p>
+            <a:pPr algn="ctr"/>
+            <a:r>
+              <a:rPr lang="en-US" altLang="ko-KR" sz="1400" dirty="0" err="1" smtClean="0">
+                <a:solidFill>
+                  <a:schemeClr val="tx1"/>
+                </a:solidFill>
+              </a:rPr>
+              <a:t>mySQL</a:t>
+            </a:r>
+            <a:r>
+              <a:rPr lang="ko-KR" altLang="en-US" sz="1400" dirty="0" smtClean="0">
+                <a:solidFill>
+                  <a:schemeClr val="tx1"/>
+                </a:solidFill>
+              </a:rPr>
+              <a:t>이 설치된 경우 포트를 변경 하여 설치</a:t>
+            </a:r>
+            <a:endParaRPr lang="ko-KR" altLang="en-US" sz="1400" dirty="0">
+              <a:solidFill>
+                <a:schemeClr val="tx1"/>
+              </a:solidFill>
+            </a:endParaRPr>
+          </a:p>
+        </p:txBody>
+      </p:sp>
     </p:spTree>
     <p:extLst>
       <p:ext uri="{BB962C8B-B14F-4D97-AF65-F5344CB8AC3E}">
-        <p14:creationId xmlns:p14="http://schemas.microsoft.com/office/powerpoint/2010/main" val="1379419042"/>
+        <p14:creationId xmlns:p14="http://schemas.microsoft.com/office/powerpoint/2010/main" val="418524448"/>
       </p:ext>
     </p:extLst>
   </p:cSld>
@@ -12068,24 +10688,6 @@
             </a:lvl9pPr>
           </a:lstStyle>
           <a:p>
-            <a:pPr>
-              <a:lnSpc>
-                <a:spcPct val="150000"/>
-              </a:lnSpc>
-              <a:buFontTx/>
-              <a:buChar char="-"/>
-            </a:pPr>
-            <a:r>
-              <a:rPr lang="en-US" altLang="ko-KR" dirty="0" smtClean="0"/>
-              <a:t>MySQL </a:t>
-            </a:r>
-            <a:r>
-              <a:rPr lang="ko-KR" altLang="en-US" dirty="0" smtClean="0"/>
-              <a:t>삭제</a:t>
-            </a:r>
-            <a:endParaRPr lang="en-US" altLang="ko-KR" dirty="0" smtClean="0"/>
-          </a:p>
-          <a:p>
             <a:pPr marL="0" indent="0">
               <a:lnSpc>
                 <a:spcPct val="150000"/>
@@ -12093,16 +10695,8 @@
               <a:buNone/>
             </a:pPr>
             <a:r>
-              <a:rPr lang="en-US" altLang="ko-KR" dirty="0"/>
-              <a:t> </a:t>
-            </a:r>
-            <a:r>
-              <a:rPr lang="en-US" altLang="ko-KR" dirty="0" smtClean="0"/>
-              <a:t> Remove </a:t>
-            </a:r>
-            <a:r>
               <a:rPr lang="ko-KR" altLang="en-US" dirty="0" smtClean="0"/>
-              <a:t>실행</a:t>
+              <a:t>다운로드 및 설치</a:t>
             </a:r>
             <a:endParaRPr lang="en-US" altLang="ko-KR" dirty="0" smtClean="0"/>
           </a:p>
@@ -12110,7 +10704,7 @@
       </p:sp>
       <p:pic>
         <p:nvPicPr>
-          <p:cNvPr id="2" name="그림 1"/>
+          <p:cNvPr id="4" name="그림 3"/>
           <p:cNvPicPr>
             <a:picLocks noChangeAspect="1"/>
           </p:cNvPicPr>
@@ -12124,8 +10718,8 @@
         </p:blipFill>
         <p:spPr>
           <a:xfrm>
-            <a:off x="4431995" y="930514"/>
-            <a:ext cx="7486650" cy="5648325"/>
+            <a:off x="532355" y="2548843"/>
+            <a:ext cx="4714875" cy="3686175"/>
           </a:xfrm>
           <a:prstGeom prst="rect">
             <a:avLst/>
@@ -12134,14 +10728,14 @@
       </p:pic>
       <p:sp>
         <p:nvSpPr>
-          <p:cNvPr id="8" name="직사각형 7"/>
+          <p:cNvPr id="15" name="직사각형 14"/>
           <p:cNvSpPr/>
           <p:nvPr/>
         </p:nvSpPr>
         <p:spPr>
           <a:xfrm>
-            <a:off x="9989507" y="6117579"/>
-            <a:ext cx="1070713" cy="461260"/>
+            <a:off x="3136878" y="5803414"/>
+            <a:ext cx="1157767" cy="451950"/>
           </a:xfrm>
           <a:prstGeom prst="rect">
             <a:avLst/>
@@ -12178,10 +10772,34 @@
           </a:p>
         </p:txBody>
       </p:sp>
+      <p:pic>
+        <p:nvPicPr>
+          <p:cNvPr id="5" name="그림 4"/>
+          <p:cNvPicPr>
+            <a:picLocks noChangeAspect="1"/>
+          </p:cNvPicPr>
+          <p:nvPr/>
+        </p:nvPicPr>
+        <p:blipFill>
+          <a:blip r:embed="rId3"/>
+          <a:stretch>
+            <a:fillRect/>
+          </a:stretch>
+        </p:blipFill>
+        <p:spPr>
+          <a:xfrm>
+            <a:off x="5494315" y="2343214"/>
+            <a:ext cx="4714875" cy="3686175"/>
+          </a:xfrm>
+          <a:prstGeom prst="rect">
+            <a:avLst/>
+          </a:prstGeom>
+        </p:spPr>
+      </p:pic>
     </p:spTree>
     <p:extLst>
       <p:ext uri="{BB962C8B-B14F-4D97-AF65-F5344CB8AC3E}">
-        <p14:creationId xmlns:p14="http://schemas.microsoft.com/office/powerpoint/2010/main" val="2893668876"/>
+        <p14:creationId xmlns:p14="http://schemas.microsoft.com/office/powerpoint/2010/main" val="2827072857"/>
       </p:ext>
     </p:extLst>
   </p:cSld>
@@ -12449,77 +11067,8 @@
               <a:buNone/>
             </a:pPr>
             <a:r>
-              <a:rPr lang="ko-KR" altLang="en-US" dirty="0" smtClean="0"/>
-              <a:t>다운로드 및 설치</a:t>
-            </a:r>
-            <a:endParaRPr lang="en-US" altLang="ko-KR" dirty="0" smtClean="0"/>
-          </a:p>
-          <a:p>
-            <a:pPr marL="0" indent="0">
-              <a:lnSpc>
-                <a:spcPct val="150000"/>
-              </a:lnSpc>
-              <a:buNone/>
-            </a:pPr>
-            <a:r>
-              <a:rPr lang="ko-KR" altLang="en-US" dirty="0" smtClean="0"/>
-              <a:t>  </a:t>
-            </a:r>
-            <a:r>
-              <a:rPr lang="en-US" altLang="ko-KR" dirty="0"/>
-              <a:t>- </a:t>
-            </a:r>
-            <a:r>
-              <a:rPr lang="ko-KR" altLang="en-US" dirty="0" smtClean="0"/>
-              <a:t>다운로드링크</a:t>
-            </a:r>
-            <a:endParaRPr lang="en-US" altLang="ko-KR" dirty="0" smtClean="0"/>
-          </a:p>
-          <a:p>
-            <a:pPr marL="0" indent="0">
-              <a:lnSpc>
-                <a:spcPct val="150000"/>
-              </a:lnSpc>
-              <a:buNone/>
-            </a:pPr>
-            <a:r>
-              <a:rPr lang="en-US" altLang="ko-KR" dirty="0" smtClean="0">
-                <a:hlinkClick r:id="rId2"/>
-              </a:rPr>
-              <a:t>https</a:t>
-            </a:r>
-            <a:r>
-              <a:rPr lang="en-US" altLang="ko-KR" dirty="0">
-                <a:hlinkClick r:id="rId2"/>
-              </a:rPr>
-              <a:t>://mariadb.org/download/?</a:t>
-            </a:r>
-            <a:r>
-              <a:rPr lang="en-US" altLang="ko-KR" dirty="0" smtClean="0">
-                <a:hlinkClick r:id="rId2"/>
-              </a:rPr>
-              <a:t>t=mariadb&amp;p=mariadb&amp;r=10.6.8&amp;os=windows&amp;cpu=x86_64&amp;pkg=msi&amp;m=yongbok</a:t>
-            </a:r>
-            <a:endParaRPr lang="en-US" altLang="ko-KR" dirty="0" smtClean="0"/>
-          </a:p>
-          <a:p>
-            <a:pPr marL="0" indent="0">
-              <a:lnSpc>
-                <a:spcPct val="150000"/>
-              </a:lnSpc>
-              <a:buNone/>
-            </a:pPr>
-            <a:r>
-              <a:rPr lang="en-US" altLang="ko-KR" dirty="0"/>
-              <a:t> </a:t>
-            </a:r>
-            <a:r>
-              <a:rPr lang="en-US" altLang="ko-KR" dirty="0" smtClean="0"/>
-              <a:t> - </a:t>
-            </a:r>
-            <a:r>
               <a:rPr lang="en-US" altLang="ko-KR" dirty="0" err="1" smtClean="0"/>
-              <a:t>mariaDB</a:t>
+              <a:t>HeidiSQL</a:t>
             </a:r>
             <a:r>
               <a:rPr lang="en-US" altLang="ko-KR" dirty="0" smtClean="0"/>
@@ -12527,319 +11076,7 @@
             </a:r>
             <a:r>
               <a:rPr lang="ko-KR" altLang="en-US" dirty="0" smtClean="0"/>
-              <a:t>홈페이지</a:t>
-            </a:r>
-            <a:r>
-              <a:rPr lang="en-US" altLang="ko-KR" dirty="0" smtClean="0"/>
-              <a:t>(</a:t>
-            </a:r>
-            <a:r>
-              <a:rPr lang="en-US" altLang="ko-KR" dirty="0" smtClean="0">
-                <a:hlinkClick r:id="rId3"/>
-              </a:rPr>
-              <a:t>https://mariadb.org</a:t>
-            </a:r>
-            <a:r>
-              <a:rPr lang="en-US" altLang="ko-KR" dirty="0" smtClean="0"/>
-              <a:t>) </a:t>
-            </a:r>
-          </a:p>
-          <a:p>
-            <a:pPr marL="0" indent="0">
-              <a:lnSpc>
-                <a:spcPct val="150000"/>
-              </a:lnSpc>
-              <a:buNone/>
-            </a:pPr>
-            <a:r>
-              <a:rPr lang="en-US" altLang="ko-KR" dirty="0"/>
-              <a:t> </a:t>
-            </a:r>
-            <a:r>
-              <a:rPr lang="en-US" altLang="ko-KR" dirty="0" smtClean="0"/>
-              <a:t>    =&gt; download </a:t>
-            </a:r>
-            <a:r>
-              <a:rPr lang="ko-KR" altLang="en-US" dirty="0" smtClean="0"/>
-              <a:t>페이지 접속</a:t>
-            </a:r>
-            <a:endParaRPr lang="en-US" altLang="ko-KR" dirty="0"/>
-          </a:p>
-        </p:txBody>
-      </p:sp>
-    </p:spTree>
-    <p:extLst>
-      <p:ext uri="{BB962C8B-B14F-4D97-AF65-F5344CB8AC3E}">
-        <p14:creationId xmlns:p14="http://schemas.microsoft.com/office/powerpoint/2010/main" val="508658935"/>
-      </p:ext>
-    </p:extLst>
-  </p:cSld>
-  <p:clrMapOvr>
-    <a:masterClrMapping/>
-  </p:clrMapOvr>
-</p:sld>
-</file>
-
-<file path=ppt/slides/slide9.xml><?xml version="1.0" encoding="utf-8"?>
-<p:sld xmlns:a="http://schemas.openxmlformats.org/drawingml/2006/main" xmlns:r="http://schemas.openxmlformats.org/officeDocument/2006/relationships" xmlns:p="http://schemas.openxmlformats.org/presentationml/2006/main">
-  <p:cSld>
-    <p:spTree>
-      <p:nvGrpSpPr>
-        <p:cNvPr id="1" name=""/>
-        <p:cNvGrpSpPr/>
-        <p:nvPr/>
-      </p:nvGrpSpPr>
-      <p:grpSpPr>
-        <a:xfrm>
-          <a:off x="0" y="0"/>
-          <a:ext cx="0" cy="0"/>
-          <a:chOff x="0" y="0"/>
-          <a:chExt cx="0" cy="0"/>
-        </a:xfrm>
-      </p:grpSpPr>
-      <p:sp>
-        <p:nvSpPr>
-          <p:cNvPr id="44" name="도형 17"/>
-          <p:cNvSpPr>
-            <a:spLocks/>
-          </p:cNvSpPr>
-          <p:nvPr/>
-        </p:nvSpPr>
-        <p:spPr>
-          <a:xfrm>
-            <a:off x="765868" y="316230"/>
-            <a:ext cx="1074333" cy="454292"/>
-          </a:xfrm>
-          <a:prstGeom prst="rect">
-            <a:avLst/>
-          </a:prstGeom>
-          <a:ln w="0">
-            <a:noFill/>
-            <a:prstDash/>
-          </a:ln>
-        </p:spPr>
-        <p:txBody>
-          <a:bodyPr vert="horz" wrap="none" lIns="91440" tIns="45720" rIns="91440" bIns="45720" numCol="1" anchor="t">
-            <a:spAutoFit/>
-          </a:bodyPr>
-          <a:lstStyle/>
-          <a:p>
-            <a:pPr marL="0" indent="0" latinLnBrk="0">
-              <a:lnSpc>
-                <a:spcPct val="150000"/>
-              </a:lnSpc>
-              <a:buFontTx/>
-              <a:buNone/>
-            </a:pPr>
-            <a:r>
-              <a:rPr lang="en-US" altLang="ko-KR" dirty="0" err="1" smtClean="0">
-                <a:solidFill>
-                  <a:schemeClr val="bg1"/>
-                </a:solidFill>
-              </a:rPr>
-              <a:t>MariaDB</a:t>
-            </a:r>
-            <a:endParaRPr lang="ko-KR" altLang="en-US" dirty="0">
-              <a:solidFill>
-                <a:schemeClr val="bg1"/>
-              </a:solidFill>
-            </a:endParaRPr>
-          </a:p>
-        </p:txBody>
-      </p:sp>
-      <p:sp>
-        <p:nvSpPr>
-          <p:cNvPr id="7" name="내용 개체 틀 2"/>
-          <p:cNvSpPr txBox="1">
-            <a:spLocks/>
-          </p:cNvSpPr>
-          <p:nvPr/>
-        </p:nvSpPr>
-        <p:spPr>
-          <a:xfrm>
-            <a:off x="457200" y="1334192"/>
-            <a:ext cx="11222182" cy="4525963"/>
-          </a:xfrm>
-          <a:prstGeom prst="rect">
-            <a:avLst/>
-          </a:prstGeom>
-        </p:spPr>
-        <p:txBody>
-          <a:bodyPr/>
-          <a:lstStyle>
-            <a:lvl1pPr marL="228600" indent="-228600" algn="l" defTabSz="914400" rtl="0" eaLnBrk="1" latinLnBrk="1" hangingPunct="1">
-              <a:lnSpc>
-                <a:spcPct val="90000"/>
-              </a:lnSpc>
-              <a:spcBef>
-                <a:spcPts val="1000"/>
-              </a:spcBef>
-              <a:buFont typeface="Arial" panose="020B0604020202020204" pitchFamily="34" charset="0"/>
-              <a:buChar char="•"/>
-              <a:defRPr sz="2800" kern="1200">
-                <a:solidFill>
-                  <a:schemeClr val="tx1"/>
-                </a:solidFill>
-                <a:latin typeface="+mn-lt"/>
-                <a:ea typeface="+mn-ea"/>
-                <a:cs typeface="+mn-cs"/>
-              </a:defRPr>
-            </a:lvl1pPr>
-            <a:lvl2pPr marL="685800" indent="-228600" algn="l" defTabSz="914400" rtl="0" eaLnBrk="1" latinLnBrk="1" hangingPunct="1">
-              <a:lnSpc>
-                <a:spcPct val="90000"/>
-              </a:lnSpc>
-              <a:spcBef>
-                <a:spcPts val="500"/>
-              </a:spcBef>
-              <a:buFont typeface="Arial" panose="020B0604020202020204" pitchFamily="34" charset="0"/>
-              <a:buChar char="•"/>
-              <a:defRPr sz="2400" kern="1200">
-                <a:solidFill>
-                  <a:schemeClr val="tx1"/>
-                </a:solidFill>
-                <a:latin typeface="+mn-lt"/>
-                <a:ea typeface="+mn-ea"/>
-                <a:cs typeface="+mn-cs"/>
-              </a:defRPr>
-            </a:lvl2pPr>
-            <a:lvl3pPr marL="1143000" indent="-228600" algn="l" defTabSz="914400" rtl="0" eaLnBrk="1" latinLnBrk="1" hangingPunct="1">
-              <a:lnSpc>
-                <a:spcPct val="90000"/>
-              </a:lnSpc>
-              <a:spcBef>
-                <a:spcPts val="500"/>
-              </a:spcBef>
-              <a:buFont typeface="Arial" panose="020B0604020202020204" pitchFamily="34" charset="0"/>
-              <a:buChar char="•"/>
-              <a:defRPr sz="2000" kern="1200">
-                <a:solidFill>
-                  <a:schemeClr val="tx1"/>
-                </a:solidFill>
-                <a:latin typeface="+mn-lt"/>
-                <a:ea typeface="+mn-ea"/>
-                <a:cs typeface="+mn-cs"/>
-              </a:defRPr>
-            </a:lvl3pPr>
-            <a:lvl4pPr marL="1600200" indent="-228600" algn="l" defTabSz="914400" rtl="0" eaLnBrk="1" latinLnBrk="1" hangingPunct="1">
-              <a:lnSpc>
-                <a:spcPct val="90000"/>
-              </a:lnSpc>
-              <a:spcBef>
-                <a:spcPts val="500"/>
-              </a:spcBef>
-              <a:buFont typeface="Arial" panose="020B0604020202020204" pitchFamily="34" charset="0"/>
-              <a:buChar char="•"/>
-              <a:defRPr sz="1800" kern="1200">
-                <a:solidFill>
-                  <a:schemeClr val="tx1"/>
-                </a:solidFill>
-                <a:latin typeface="+mn-lt"/>
-                <a:ea typeface="+mn-ea"/>
-                <a:cs typeface="+mn-cs"/>
-              </a:defRPr>
-            </a:lvl4pPr>
-            <a:lvl5pPr marL="2057400" indent="-228600" algn="l" defTabSz="914400" rtl="0" eaLnBrk="1" latinLnBrk="1" hangingPunct="1">
-              <a:lnSpc>
-                <a:spcPct val="90000"/>
-              </a:lnSpc>
-              <a:spcBef>
-                <a:spcPts val="500"/>
-              </a:spcBef>
-              <a:buFont typeface="Arial" panose="020B0604020202020204" pitchFamily="34" charset="0"/>
-              <a:buChar char="•"/>
-              <a:defRPr sz="1800" kern="1200">
-                <a:solidFill>
-                  <a:schemeClr val="tx1"/>
-                </a:solidFill>
-                <a:latin typeface="+mn-lt"/>
-                <a:ea typeface="+mn-ea"/>
-                <a:cs typeface="+mn-cs"/>
-              </a:defRPr>
-            </a:lvl5pPr>
-            <a:lvl6pPr marL="2514600" indent="-228600" algn="l" defTabSz="914400" rtl="0" eaLnBrk="1" latinLnBrk="1" hangingPunct="1">
-              <a:lnSpc>
-                <a:spcPct val="90000"/>
-              </a:lnSpc>
-              <a:spcBef>
-                <a:spcPts val="500"/>
-              </a:spcBef>
-              <a:buFont typeface="Arial" panose="020B0604020202020204" pitchFamily="34" charset="0"/>
-              <a:buChar char="•"/>
-              <a:defRPr sz="1800" kern="1200">
-                <a:solidFill>
-                  <a:schemeClr val="tx1"/>
-                </a:solidFill>
-                <a:latin typeface="+mn-lt"/>
-                <a:ea typeface="+mn-ea"/>
-                <a:cs typeface="+mn-cs"/>
-              </a:defRPr>
-            </a:lvl6pPr>
-            <a:lvl7pPr marL="2971800" indent="-228600" algn="l" defTabSz="914400" rtl="0" eaLnBrk="1" latinLnBrk="1" hangingPunct="1">
-              <a:lnSpc>
-                <a:spcPct val="90000"/>
-              </a:lnSpc>
-              <a:spcBef>
-                <a:spcPts val="500"/>
-              </a:spcBef>
-              <a:buFont typeface="Arial" panose="020B0604020202020204" pitchFamily="34" charset="0"/>
-              <a:buChar char="•"/>
-              <a:defRPr sz="1800" kern="1200">
-                <a:solidFill>
-                  <a:schemeClr val="tx1"/>
-                </a:solidFill>
-                <a:latin typeface="+mn-lt"/>
-                <a:ea typeface="+mn-ea"/>
-                <a:cs typeface="+mn-cs"/>
-              </a:defRPr>
-            </a:lvl7pPr>
-            <a:lvl8pPr marL="3429000" indent="-228600" algn="l" defTabSz="914400" rtl="0" eaLnBrk="1" latinLnBrk="1" hangingPunct="1">
-              <a:lnSpc>
-                <a:spcPct val="90000"/>
-              </a:lnSpc>
-              <a:spcBef>
-                <a:spcPts val="500"/>
-              </a:spcBef>
-              <a:buFont typeface="Arial" panose="020B0604020202020204" pitchFamily="34" charset="0"/>
-              <a:buChar char="•"/>
-              <a:defRPr sz="1800" kern="1200">
-                <a:solidFill>
-                  <a:schemeClr val="tx1"/>
-                </a:solidFill>
-                <a:latin typeface="+mn-lt"/>
-                <a:ea typeface="+mn-ea"/>
-                <a:cs typeface="+mn-cs"/>
-              </a:defRPr>
-            </a:lvl8pPr>
-            <a:lvl9pPr marL="3886200" indent="-228600" algn="l" defTabSz="914400" rtl="0" eaLnBrk="1" latinLnBrk="1" hangingPunct="1">
-              <a:lnSpc>
-                <a:spcPct val="90000"/>
-              </a:lnSpc>
-              <a:spcBef>
-                <a:spcPts val="500"/>
-              </a:spcBef>
-              <a:buFont typeface="Arial" panose="020B0604020202020204" pitchFamily="34" charset="0"/>
-              <a:buChar char="•"/>
-              <a:defRPr sz="1800" kern="1200">
-                <a:solidFill>
-                  <a:schemeClr val="tx1"/>
-                </a:solidFill>
-                <a:latin typeface="+mn-lt"/>
-                <a:ea typeface="+mn-ea"/>
-                <a:cs typeface="+mn-cs"/>
-              </a:defRPr>
-            </a:lvl9pPr>
-          </a:lstStyle>
-          <a:p>
-            <a:pPr marL="0" indent="0">
-              <a:lnSpc>
-                <a:spcPct val="150000"/>
-              </a:lnSpc>
-              <a:buNone/>
-            </a:pPr>
-            <a:r>
-              <a:rPr lang="ko-KR" altLang="en-US" dirty="0" smtClean="0"/>
-              <a:t>다운로드 및 설치</a:t>
+              <a:t>접속</a:t>
             </a:r>
             <a:endParaRPr lang="en-US" altLang="ko-KR" dirty="0" smtClean="0"/>
           </a:p>
@@ -12861,8 +11098,8 @@
         </p:blipFill>
         <p:spPr>
           <a:xfrm>
-            <a:off x="1105943" y="2053809"/>
-            <a:ext cx="9102770" cy="4551384"/>
+            <a:off x="765868" y="2580361"/>
+            <a:ext cx="4297341" cy="3069529"/>
           </a:xfrm>
           <a:prstGeom prst="rect">
             <a:avLst/>
@@ -12871,14 +11108,14 @@
       </p:pic>
       <p:sp>
         <p:nvSpPr>
-          <p:cNvPr id="3" name="직사각형 2"/>
+          <p:cNvPr id="8" name="직사각형 7"/>
           <p:cNvSpPr/>
           <p:nvPr/>
         </p:nvSpPr>
         <p:spPr>
           <a:xfrm>
-            <a:off x="4208745" y="6012493"/>
-            <a:ext cx="1352811" cy="751562"/>
+            <a:off x="753342" y="5373665"/>
+            <a:ext cx="561891" cy="315543"/>
           </a:xfrm>
           <a:prstGeom prst="rect">
             <a:avLst/>
@@ -12915,10 +11152,80 @@
           </a:p>
         </p:txBody>
       </p:sp>
+      <p:sp>
+        <p:nvSpPr>
+          <p:cNvPr id="9" name="직사각형 8"/>
+          <p:cNvSpPr/>
+          <p:nvPr/>
+        </p:nvSpPr>
+        <p:spPr>
+          <a:xfrm>
+            <a:off x="3310739" y="3321295"/>
+            <a:ext cx="1875036" cy="1050289"/>
+          </a:xfrm>
+          <a:prstGeom prst="rect">
+            <a:avLst/>
+          </a:prstGeom>
+          <a:noFill/>
+          <a:ln w="28575">
+            <a:solidFill>
+              <a:srgbClr val="FF0000"/>
+            </a:solidFill>
+          </a:ln>
+        </p:spPr>
+        <p:style>
+          <a:lnRef idx="2">
+            <a:schemeClr val="accent1">
+              <a:shade val="50000"/>
+            </a:schemeClr>
+          </a:lnRef>
+          <a:fillRef idx="1">
+            <a:schemeClr val="accent1"/>
+          </a:fillRef>
+          <a:effectRef idx="0">
+            <a:schemeClr val="accent1"/>
+          </a:effectRef>
+          <a:fontRef idx="minor">
+            <a:schemeClr val="lt1"/>
+          </a:fontRef>
+        </p:style>
+        <p:txBody>
+          <a:bodyPr rtlCol="0" anchor="ctr"/>
+          <a:lstStyle/>
+          <a:p>
+            <a:pPr algn="ctr"/>
+            <a:endParaRPr lang="ko-KR" altLang="en-US"/>
+          </a:p>
+        </p:txBody>
+      </p:sp>
+      <p:pic>
+        <p:nvPicPr>
+          <p:cNvPr id="3" name="그림 2"/>
+          <p:cNvPicPr>
+            <a:picLocks noChangeAspect="1"/>
+          </p:cNvPicPr>
+          <p:nvPr/>
+        </p:nvPicPr>
+        <p:blipFill>
+          <a:blip r:embed="rId3"/>
+          <a:stretch>
+            <a:fillRect/>
+          </a:stretch>
+        </p:blipFill>
+        <p:spPr>
+          <a:xfrm>
+            <a:off x="5638497" y="2008582"/>
+            <a:ext cx="5788578" cy="3680626"/>
+          </a:xfrm>
+          <a:prstGeom prst="rect">
+            <a:avLst/>
+          </a:prstGeom>
+        </p:spPr>
+      </p:pic>
     </p:spTree>
     <p:extLst>
       <p:ext uri="{BB962C8B-B14F-4D97-AF65-F5344CB8AC3E}">
-        <p14:creationId xmlns:p14="http://schemas.microsoft.com/office/powerpoint/2010/main" val="1607997491"/>
+        <p14:creationId xmlns:p14="http://schemas.microsoft.com/office/powerpoint/2010/main" val="1113111086"/>
       </p:ext>
     </p:extLst>
   </p:cSld>

</xml_diff>